<commit_message>
[master] fixed typos in lesson 7
</commit_message>
<xml_diff>
--- a/lab_07-state_management/lab_07-state_management.pptx
+++ b/lab_07-state_management/lab_07-state_management.pptx
@@ -233,7 +233,7 @@
           <a:p>
             <a:fld id="{81C4B3FE-0320-8142-8396-5C3025C019EC}" type="datetimeFigureOut">
               <a:rPr lang="en-IT" smtClean="0"/>
-              <a:t>23/02/22</a:t>
+              <a:t>11/04/22</a:t>
             </a:fld>
             <a:endParaRPr lang="en-IT"/>
           </a:p>
@@ -2799,6 +2799,7 @@
     <p:sldLayoutId id="2147483649" r:id="rId3"/>
     <p:sldLayoutId id="2147483654" r:id="rId4"/>
   </p:sldLayoutIdLst>
+  <p:hf hdr="0" ftr="0" dt="0"/>
   <p:txStyles>
     <p:titleStyle>
       <a:lvl1pPr algn="ctr" defTabSz="914400" rtl="0" eaLnBrk="1" latinLnBrk="0" hangingPunct="1">
@@ -3669,6 +3670,35 @@
           </a:prstGeom>
         </p:spPr>
       </p:pic>
+      <p:sp>
+        <p:nvSpPr>
+          <p:cNvPr id="3" name="Slide Number Placeholder 2">
+            <a:extLst>
+              <a:ext uri="{FF2B5EF4-FFF2-40B4-BE49-F238E27FC236}">
+                <a16:creationId xmlns:a16="http://schemas.microsoft.com/office/drawing/2014/main" id="{EB33B2A1-2C1D-B44A-9418-099FE9135F5A}"/>
+              </a:ext>
+            </a:extLst>
+          </p:cNvPr>
+          <p:cNvSpPr>
+            <a:spLocks noGrp="1"/>
+          </p:cNvSpPr>
+          <p:nvPr>
+            <p:ph type="sldNum" sz="quarter" idx="12"/>
+          </p:nvPr>
+        </p:nvSpPr>
+        <p:spPr/>
+        <p:txBody>
+          <a:bodyPr/>
+          <a:lstStyle/>
+          <a:p>
+            <a:fld id="{31DE2C5B-556E-47B8-A792-024C2FCA4ACC}" type="slidenum">
+              <a:rPr lang="en-GB" smtClean="0"/>
+              <a:t>10</a:t>
+            </a:fld>
+            <a:endParaRPr lang="en-GB"/>
+          </a:p>
+        </p:txBody>
+      </p:sp>
     </p:spTree>
     <p:extLst>
       <p:ext uri="{BB962C8B-B14F-4D97-AF65-F5344CB8AC3E}">
@@ -3919,6 +3949,35 @@
           </a:prstGeom>
         </p:spPr>
       </p:pic>
+      <p:sp>
+        <p:nvSpPr>
+          <p:cNvPr id="3" name="Slide Number Placeholder 2">
+            <a:extLst>
+              <a:ext uri="{FF2B5EF4-FFF2-40B4-BE49-F238E27FC236}">
+                <a16:creationId xmlns:a16="http://schemas.microsoft.com/office/drawing/2014/main" id="{6797FD1F-2322-984C-8667-6DAB87C3466D}"/>
+              </a:ext>
+            </a:extLst>
+          </p:cNvPr>
+          <p:cNvSpPr>
+            <a:spLocks noGrp="1"/>
+          </p:cNvSpPr>
+          <p:nvPr>
+            <p:ph type="sldNum" sz="quarter" idx="12"/>
+          </p:nvPr>
+        </p:nvSpPr>
+        <p:spPr/>
+        <p:txBody>
+          <a:bodyPr/>
+          <a:lstStyle/>
+          <a:p>
+            <a:fld id="{31DE2C5B-556E-47B8-A792-024C2FCA4ACC}" type="slidenum">
+              <a:rPr lang="en-GB" smtClean="0"/>
+              <a:t>11</a:t>
+            </a:fld>
+            <a:endParaRPr lang="en-GB"/>
+          </a:p>
+        </p:txBody>
+      </p:sp>
     </p:spTree>
     <p:extLst>
       <p:ext uri="{BB962C8B-B14F-4D97-AF65-F5344CB8AC3E}">
@@ -4108,6 +4167,35 @@
           </a:p>
         </p:txBody>
       </p:sp>
+      <p:sp>
+        <p:nvSpPr>
+          <p:cNvPr id="4" name="Slide Number Placeholder 3">
+            <a:extLst>
+              <a:ext uri="{FF2B5EF4-FFF2-40B4-BE49-F238E27FC236}">
+                <a16:creationId xmlns:a16="http://schemas.microsoft.com/office/drawing/2014/main" id="{0E1F47AE-2F81-FB4D-B57D-63D1FAF7FA86}"/>
+              </a:ext>
+            </a:extLst>
+          </p:cNvPr>
+          <p:cNvSpPr>
+            <a:spLocks noGrp="1"/>
+          </p:cNvSpPr>
+          <p:nvPr>
+            <p:ph type="sldNum" sz="quarter" idx="12"/>
+          </p:nvPr>
+        </p:nvSpPr>
+        <p:spPr/>
+        <p:txBody>
+          <a:bodyPr/>
+          <a:lstStyle/>
+          <a:p>
+            <a:fld id="{31DE2C5B-556E-47B8-A792-024C2FCA4ACC}" type="slidenum">
+              <a:rPr lang="en-GB" smtClean="0"/>
+              <a:t>12</a:t>
+            </a:fld>
+            <a:endParaRPr lang="en-GB"/>
+          </a:p>
+        </p:txBody>
+      </p:sp>
     </p:spTree>
     <p:extLst>
       <p:ext uri="{BB962C8B-B14F-4D97-AF65-F5344CB8AC3E}">
@@ -4950,6 +5038,35 @@
           </a:prstGeom>
         </p:spPr>
       </p:pic>
+      <p:sp>
+        <p:nvSpPr>
+          <p:cNvPr id="3" name="Slide Number Placeholder 2">
+            <a:extLst>
+              <a:ext uri="{FF2B5EF4-FFF2-40B4-BE49-F238E27FC236}">
+                <a16:creationId xmlns:a16="http://schemas.microsoft.com/office/drawing/2014/main" id="{81CEAD88-D347-D143-9401-33F27489558E}"/>
+              </a:ext>
+            </a:extLst>
+          </p:cNvPr>
+          <p:cNvSpPr>
+            <a:spLocks noGrp="1"/>
+          </p:cNvSpPr>
+          <p:nvPr>
+            <p:ph type="sldNum" sz="quarter" idx="12"/>
+          </p:nvPr>
+        </p:nvSpPr>
+        <p:spPr/>
+        <p:txBody>
+          <a:bodyPr/>
+          <a:lstStyle/>
+          <a:p>
+            <a:fld id="{31DE2C5B-556E-47B8-A792-024C2FCA4ACC}" type="slidenum">
+              <a:rPr lang="en-GB" smtClean="0"/>
+              <a:t>13</a:t>
+            </a:fld>
+            <a:endParaRPr lang="en-GB"/>
+          </a:p>
+        </p:txBody>
+      </p:sp>
     </p:spTree>
     <p:extLst>
       <p:ext uri="{BB962C8B-B14F-4D97-AF65-F5344CB8AC3E}">
@@ -5153,6 +5270,35 @@
           </a:p>
         </p:txBody>
       </p:sp>
+      <p:sp>
+        <p:nvSpPr>
+          <p:cNvPr id="3" name="Slide Number Placeholder 2">
+            <a:extLst>
+              <a:ext uri="{FF2B5EF4-FFF2-40B4-BE49-F238E27FC236}">
+                <a16:creationId xmlns:a16="http://schemas.microsoft.com/office/drawing/2014/main" id="{DA58FD6E-13BF-C145-A759-4E1D4124510F}"/>
+              </a:ext>
+            </a:extLst>
+          </p:cNvPr>
+          <p:cNvSpPr>
+            <a:spLocks noGrp="1"/>
+          </p:cNvSpPr>
+          <p:nvPr>
+            <p:ph type="sldNum" sz="quarter" idx="12"/>
+          </p:nvPr>
+        </p:nvSpPr>
+        <p:spPr/>
+        <p:txBody>
+          <a:bodyPr/>
+          <a:lstStyle/>
+          <a:p>
+            <a:fld id="{31DE2C5B-556E-47B8-A792-024C2FCA4ACC}" type="slidenum">
+              <a:rPr lang="en-GB" smtClean="0"/>
+              <a:t>14</a:t>
+            </a:fld>
+            <a:endParaRPr lang="en-GB"/>
+          </a:p>
+        </p:txBody>
+      </p:sp>
     </p:spTree>
     <p:extLst>
       <p:ext uri="{BB962C8B-B14F-4D97-AF65-F5344CB8AC3E}">
@@ -5346,6 +5492,35 @@
           </a:p>
         </p:txBody>
       </p:sp>
+      <p:sp>
+        <p:nvSpPr>
+          <p:cNvPr id="3" name="Slide Number Placeholder 2">
+            <a:extLst>
+              <a:ext uri="{FF2B5EF4-FFF2-40B4-BE49-F238E27FC236}">
+                <a16:creationId xmlns:a16="http://schemas.microsoft.com/office/drawing/2014/main" id="{7B5FFEB4-86CC-D24E-AECC-C61D8D8E46E9}"/>
+              </a:ext>
+            </a:extLst>
+          </p:cNvPr>
+          <p:cNvSpPr>
+            <a:spLocks noGrp="1"/>
+          </p:cNvSpPr>
+          <p:nvPr>
+            <p:ph type="sldNum" sz="quarter" idx="12"/>
+          </p:nvPr>
+        </p:nvSpPr>
+        <p:spPr/>
+        <p:txBody>
+          <a:bodyPr/>
+          <a:lstStyle/>
+          <a:p>
+            <a:fld id="{31DE2C5B-556E-47B8-A792-024C2FCA4ACC}" type="slidenum">
+              <a:rPr lang="en-GB" smtClean="0"/>
+              <a:t>15</a:t>
+            </a:fld>
+            <a:endParaRPr lang="en-GB"/>
+          </a:p>
+        </p:txBody>
+      </p:sp>
     </p:spTree>
     <p:extLst>
       <p:ext uri="{BB962C8B-B14F-4D97-AF65-F5344CB8AC3E}">
@@ -5450,15 +5625,15 @@
             </a:r>
             <a:r>
               <a:rPr lang="en-GB" dirty="0"/>
-              <a:t> is a class that adds and removes </a:t>
+              <a:t> is a class that can notify </a:t>
             </a:r>
             <a:r>
               <a:rPr lang="en-GB" b="1" dirty="0"/>
-              <a:t>listeners</a:t>
+              <a:t>listeners </a:t>
             </a:r>
             <a:r>
               <a:rPr lang="en-GB" dirty="0"/>
-              <a:t>, then notifies those listeners of any changes. </a:t>
+              <a:t>of any changes in the state. </a:t>
             </a:r>
           </a:p>
           <a:p>
@@ -5971,6 +6146,35 @@
           </a:fontRef>
         </p:style>
       </p:cxnSp>
+      <p:sp>
+        <p:nvSpPr>
+          <p:cNvPr id="3" name="Slide Number Placeholder 2">
+            <a:extLst>
+              <a:ext uri="{FF2B5EF4-FFF2-40B4-BE49-F238E27FC236}">
+                <a16:creationId xmlns:a16="http://schemas.microsoft.com/office/drawing/2014/main" id="{4574285D-3BDB-2340-8F11-DC7C05ED5D78}"/>
+              </a:ext>
+            </a:extLst>
+          </p:cNvPr>
+          <p:cNvSpPr>
+            <a:spLocks noGrp="1"/>
+          </p:cNvSpPr>
+          <p:nvPr>
+            <p:ph type="sldNum" sz="quarter" idx="12"/>
+          </p:nvPr>
+        </p:nvSpPr>
+        <p:spPr/>
+        <p:txBody>
+          <a:bodyPr/>
+          <a:lstStyle/>
+          <a:p>
+            <a:fld id="{31DE2C5B-556E-47B8-A792-024C2FCA4ACC}" type="slidenum">
+              <a:rPr lang="en-GB" smtClean="0"/>
+              <a:t>16</a:t>
+            </a:fld>
+            <a:endParaRPr lang="en-GB"/>
+          </a:p>
+        </p:txBody>
+      </p:sp>
     </p:spTree>
     <p:extLst>
       <p:ext uri="{BB962C8B-B14F-4D97-AF65-F5344CB8AC3E}">
@@ -7135,6 +7339,35 @@
           </a:fontRef>
         </p:style>
       </p:cxnSp>
+      <p:sp>
+        <p:nvSpPr>
+          <p:cNvPr id="3" name="Slide Number Placeholder 2">
+            <a:extLst>
+              <a:ext uri="{FF2B5EF4-FFF2-40B4-BE49-F238E27FC236}">
+                <a16:creationId xmlns:a16="http://schemas.microsoft.com/office/drawing/2014/main" id="{974894B6-4213-A44D-B473-19DC7D2EFB58}"/>
+              </a:ext>
+            </a:extLst>
+          </p:cNvPr>
+          <p:cNvSpPr>
+            <a:spLocks noGrp="1"/>
+          </p:cNvSpPr>
+          <p:nvPr>
+            <p:ph type="sldNum" sz="quarter" idx="12"/>
+          </p:nvPr>
+        </p:nvSpPr>
+        <p:spPr/>
+        <p:txBody>
+          <a:bodyPr/>
+          <a:lstStyle/>
+          <a:p>
+            <a:fld id="{31DE2C5B-556E-47B8-A792-024C2FCA4ACC}" type="slidenum">
+              <a:rPr lang="en-GB" smtClean="0"/>
+              <a:t>17</a:t>
+            </a:fld>
+            <a:endParaRPr lang="en-GB"/>
+          </a:p>
+        </p:txBody>
+      </p:sp>
     </p:spTree>
     <p:extLst>
       <p:ext uri="{BB962C8B-B14F-4D97-AF65-F5344CB8AC3E}">
@@ -8638,6 +8871,35 @@
           </a:fontRef>
         </p:style>
       </p:cxnSp>
+      <p:sp>
+        <p:nvSpPr>
+          <p:cNvPr id="3" name="Slide Number Placeholder 2">
+            <a:extLst>
+              <a:ext uri="{FF2B5EF4-FFF2-40B4-BE49-F238E27FC236}">
+                <a16:creationId xmlns:a16="http://schemas.microsoft.com/office/drawing/2014/main" id="{EEE3CC18-2D47-F945-B89B-ACEE8C1E8A95}"/>
+              </a:ext>
+            </a:extLst>
+          </p:cNvPr>
+          <p:cNvSpPr>
+            <a:spLocks noGrp="1"/>
+          </p:cNvSpPr>
+          <p:nvPr>
+            <p:ph type="sldNum" sz="quarter" idx="12"/>
+          </p:nvPr>
+        </p:nvSpPr>
+        <p:spPr/>
+        <p:txBody>
+          <a:bodyPr/>
+          <a:lstStyle/>
+          <a:p>
+            <a:fld id="{31DE2C5B-556E-47B8-A792-024C2FCA4ACC}" type="slidenum">
+              <a:rPr lang="en-GB" smtClean="0"/>
+              <a:t>18</a:t>
+            </a:fld>
+            <a:endParaRPr lang="en-GB"/>
+          </a:p>
+        </p:txBody>
+      </p:sp>
     </p:spTree>
     <p:extLst>
       <p:ext uri="{BB962C8B-B14F-4D97-AF65-F5344CB8AC3E}">
@@ -9946,6 +10208,35 @@
           </a:fontRef>
         </p:style>
       </p:cxnSp>
+      <p:sp>
+        <p:nvSpPr>
+          <p:cNvPr id="3" name="Slide Number Placeholder 2">
+            <a:extLst>
+              <a:ext uri="{FF2B5EF4-FFF2-40B4-BE49-F238E27FC236}">
+                <a16:creationId xmlns:a16="http://schemas.microsoft.com/office/drawing/2014/main" id="{BF8A145D-8226-994F-B500-D78B3CF73FB4}"/>
+              </a:ext>
+            </a:extLst>
+          </p:cNvPr>
+          <p:cNvSpPr>
+            <a:spLocks noGrp="1"/>
+          </p:cNvSpPr>
+          <p:nvPr>
+            <p:ph type="sldNum" sz="quarter" idx="12"/>
+          </p:nvPr>
+        </p:nvSpPr>
+        <p:spPr/>
+        <p:txBody>
+          <a:bodyPr/>
+          <a:lstStyle/>
+          <a:p>
+            <a:fld id="{31DE2C5B-556E-47B8-A792-024C2FCA4ACC}" type="slidenum">
+              <a:rPr lang="en-GB" smtClean="0"/>
+              <a:t>19</a:t>
+            </a:fld>
+            <a:endParaRPr lang="en-GB"/>
+          </a:p>
+        </p:txBody>
+      </p:sp>
     </p:spTree>
     <p:extLst>
       <p:ext uri="{BB962C8B-B14F-4D97-AF65-F5344CB8AC3E}">
@@ -10135,6 +10426,35 @@
           </a:p>
         </p:txBody>
       </p:sp>
+      <p:sp>
+        <p:nvSpPr>
+          <p:cNvPr id="4" name="Slide Number Placeholder 3">
+            <a:extLst>
+              <a:ext uri="{FF2B5EF4-FFF2-40B4-BE49-F238E27FC236}">
+                <a16:creationId xmlns:a16="http://schemas.microsoft.com/office/drawing/2014/main" id="{849A05B1-19C9-EE42-9540-E05EF4463F16}"/>
+              </a:ext>
+            </a:extLst>
+          </p:cNvPr>
+          <p:cNvSpPr>
+            <a:spLocks noGrp="1"/>
+          </p:cNvSpPr>
+          <p:nvPr>
+            <p:ph type="sldNum" sz="quarter" idx="12"/>
+          </p:nvPr>
+        </p:nvSpPr>
+        <p:spPr/>
+        <p:txBody>
+          <a:bodyPr/>
+          <a:lstStyle/>
+          <a:p>
+            <a:fld id="{31DE2C5B-556E-47B8-A792-024C2FCA4ACC}" type="slidenum">
+              <a:rPr lang="en-GB" smtClean="0"/>
+              <a:t>2</a:t>
+            </a:fld>
+            <a:endParaRPr lang="en-GB"/>
+          </a:p>
+        </p:txBody>
+      </p:sp>
     </p:spTree>
     <p:extLst>
       <p:ext uri="{BB962C8B-B14F-4D97-AF65-F5344CB8AC3E}">
@@ -10324,6 +10644,35 @@
           </a:p>
         </p:txBody>
       </p:sp>
+      <p:sp>
+        <p:nvSpPr>
+          <p:cNvPr id="4" name="Slide Number Placeholder 3">
+            <a:extLst>
+              <a:ext uri="{FF2B5EF4-FFF2-40B4-BE49-F238E27FC236}">
+                <a16:creationId xmlns:a16="http://schemas.microsoft.com/office/drawing/2014/main" id="{1B00669C-0B1E-1E4A-BA81-42D7EED52290}"/>
+              </a:ext>
+            </a:extLst>
+          </p:cNvPr>
+          <p:cNvSpPr>
+            <a:spLocks noGrp="1"/>
+          </p:cNvSpPr>
+          <p:nvPr>
+            <p:ph type="sldNum" sz="quarter" idx="12"/>
+          </p:nvPr>
+        </p:nvSpPr>
+        <p:spPr/>
+        <p:txBody>
+          <a:bodyPr/>
+          <a:lstStyle/>
+          <a:p>
+            <a:fld id="{31DE2C5B-556E-47B8-A792-024C2FCA4ACC}" type="slidenum">
+              <a:rPr lang="en-GB" smtClean="0"/>
+              <a:t>20</a:t>
+            </a:fld>
+            <a:endParaRPr lang="en-GB"/>
+          </a:p>
+        </p:txBody>
+      </p:sp>
     </p:spTree>
     <p:extLst>
       <p:ext uri="{BB962C8B-B14F-4D97-AF65-F5344CB8AC3E}">
@@ -10921,6 +11270,35 @@
           </a:p>
         </p:txBody>
       </p:sp>
+      <p:sp>
+        <p:nvSpPr>
+          <p:cNvPr id="3" name="Slide Number Placeholder 2">
+            <a:extLst>
+              <a:ext uri="{FF2B5EF4-FFF2-40B4-BE49-F238E27FC236}">
+                <a16:creationId xmlns:a16="http://schemas.microsoft.com/office/drawing/2014/main" id="{24DA1164-A62D-FE4C-851B-DE2158C22A39}"/>
+              </a:ext>
+            </a:extLst>
+          </p:cNvPr>
+          <p:cNvSpPr>
+            <a:spLocks noGrp="1"/>
+          </p:cNvSpPr>
+          <p:nvPr>
+            <p:ph type="sldNum" sz="quarter" idx="12"/>
+          </p:nvPr>
+        </p:nvSpPr>
+        <p:spPr/>
+        <p:txBody>
+          <a:bodyPr/>
+          <a:lstStyle/>
+          <a:p>
+            <a:fld id="{31DE2C5B-556E-47B8-A792-024C2FCA4ACC}" type="slidenum">
+              <a:rPr lang="en-GB" smtClean="0"/>
+              <a:t>21</a:t>
+            </a:fld>
+            <a:endParaRPr lang="en-GB"/>
+          </a:p>
+        </p:txBody>
+      </p:sp>
     </p:spTree>
     <p:extLst>
       <p:ext uri="{BB962C8B-B14F-4D97-AF65-F5344CB8AC3E}">
@@ -11755,6 +12133,35 @@
           </a:fontRef>
         </p:style>
       </p:cxnSp>
+      <p:sp>
+        <p:nvSpPr>
+          <p:cNvPr id="3" name="Slide Number Placeholder 2">
+            <a:extLst>
+              <a:ext uri="{FF2B5EF4-FFF2-40B4-BE49-F238E27FC236}">
+                <a16:creationId xmlns:a16="http://schemas.microsoft.com/office/drawing/2014/main" id="{D3981CBC-B992-EA4D-9D8A-EAAEA1CB419A}"/>
+              </a:ext>
+            </a:extLst>
+          </p:cNvPr>
+          <p:cNvSpPr>
+            <a:spLocks noGrp="1"/>
+          </p:cNvSpPr>
+          <p:nvPr>
+            <p:ph type="sldNum" sz="quarter" idx="12"/>
+          </p:nvPr>
+        </p:nvSpPr>
+        <p:spPr/>
+        <p:txBody>
+          <a:bodyPr/>
+          <a:lstStyle/>
+          <a:p>
+            <a:fld id="{31DE2C5B-556E-47B8-A792-024C2FCA4ACC}" type="slidenum">
+              <a:rPr lang="en-GB" smtClean="0"/>
+              <a:t>22</a:t>
+            </a:fld>
+            <a:endParaRPr lang="en-GB"/>
+          </a:p>
+        </p:txBody>
+      </p:sp>
     </p:spTree>
     <p:extLst>
       <p:ext uri="{BB962C8B-B14F-4D97-AF65-F5344CB8AC3E}">
@@ -12688,6 +13095,35 @@
             <a:endParaRPr lang="en-IT" sz="2400" dirty="0">
               <a:latin typeface="Courier" pitchFamily="2" charset="0"/>
             </a:endParaRPr>
+          </a:p>
+        </p:txBody>
+      </p:sp>
+      <p:sp>
+        <p:nvSpPr>
+          <p:cNvPr id="3" name="Slide Number Placeholder 2">
+            <a:extLst>
+              <a:ext uri="{FF2B5EF4-FFF2-40B4-BE49-F238E27FC236}">
+                <a16:creationId xmlns:a16="http://schemas.microsoft.com/office/drawing/2014/main" id="{FCF2F9D2-C34B-FC48-8479-31B23C145AA9}"/>
+              </a:ext>
+            </a:extLst>
+          </p:cNvPr>
+          <p:cNvSpPr>
+            <a:spLocks noGrp="1"/>
+          </p:cNvSpPr>
+          <p:nvPr>
+            <p:ph type="sldNum" sz="quarter" idx="12"/>
+          </p:nvPr>
+        </p:nvSpPr>
+        <p:spPr/>
+        <p:txBody>
+          <a:bodyPr/>
+          <a:lstStyle/>
+          <a:p>
+            <a:fld id="{31DE2C5B-556E-47B8-A792-024C2FCA4ACC}" type="slidenum">
+              <a:rPr lang="en-GB" smtClean="0"/>
+              <a:t>23</a:t>
+            </a:fld>
+            <a:endParaRPr lang="en-GB"/>
           </a:p>
         </p:txBody>
       </p:sp>
@@ -13164,6 +13600,35 @@
           </a:prstGeom>
         </p:spPr>
       </p:pic>
+      <p:sp>
+        <p:nvSpPr>
+          <p:cNvPr id="3" name="Slide Number Placeholder 2">
+            <a:extLst>
+              <a:ext uri="{FF2B5EF4-FFF2-40B4-BE49-F238E27FC236}">
+                <a16:creationId xmlns:a16="http://schemas.microsoft.com/office/drawing/2014/main" id="{C5E57D3A-122E-AE49-93FE-BF3A08EFB99E}"/>
+              </a:ext>
+            </a:extLst>
+          </p:cNvPr>
+          <p:cNvSpPr>
+            <a:spLocks noGrp="1"/>
+          </p:cNvSpPr>
+          <p:nvPr>
+            <p:ph type="sldNum" sz="quarter" idx="12"/>
+          </p:nvPr>
+        </p:nvSpPr>
+        <p:spPr/>
+        <p:txBody>
+          <a:bodyPr/>
+          <a:lstStyle/>
+          <a:p>
+            <a:fld id="{31DE2C5B-556E-47B8-A792-024C2FCA4ACC}" type="slidenum">
+              <a:rPr lang="en-GB" smtClean="0"/>
+              <a:t>24</a:t>
+            </a:fld>
+            <a:endParaRPr lang="en-GB"/>
+          </a:p>
+        </p:txBody>
+      </p:sp>
     </p:spTree>
     <p:extLst>
       <p:ext uri="{BB962C8B-B14F-4D97-AF65-F5344CB8AC3E}">
@@ -13353,6 +13818,35 @@
           </a:p>
         </p:txBody>
       </p:sp>
+      <p:sp>
+        <p:nvSpPr>
+          <p:cNvPr id="4" name="Slide Number Placeholder 3">
+            <a:extLst>
+              <a:ext uri="{FF2B5EF4-FFF2-40B4-BE49-F238E27FC236}">
+                <a16:creationId xmlns:a16="http://schemas.microsoft.com/office/drawing/2014/main" id="{B6F9D6CC-CC02-9045-8A89-73B8E6AACA2F}"/>
+              </a:ext>
+            </a:extLst>
+          </p:cNvPr>
+          <p:cNvSpPr>
+            <a:spLocks noGrp="1"/>
+          </p:cNvSpPr>
+          <p:nvPr>
+            <p:ph type="sldNum" sz="quarter" idx="12"/>
+          </p:nvPr>
+        </p:nvSpPr>
+        <p:spPr/>
+        <p:txBody>
+          <a:bodyPr/>
+          <a:lstStyle/>
+          <a:p>
+            <a:fld id="{31DE2C5B-556E-47B8-A792-024C2FCA4ACC}" type="slidenum">
+              <a:rPr lang="en-GB" smtClean="0"/>
+              <a:t>25</a:t>
+            </a:fld>
+            <a:endParaRPr lang="en-GB"/>
+          </a:p>
+        </p:txBody>
+      </p:sp>
     </p:spTree>
     <p:extLst>
       <p:ext uri="{BB962C8B-B14F-4D97-AF65-F5344CB8AC3E}">
@@ -13556,6 +14050,35 @@
           </a:p>
         </p:txBody>
       </p:sp>
+      <p:sp>
+        <p:nvSpPr>
+          <p:cNvPr id="3" name="Slide Number Placeholder 2">
+            <a:extLst>
+              <a:ext uri="{FF2B5EF4-FFF2-40B4-BE49-F238E27FC236}">
+                <a16:creationId xmlns:a16="http://schemas.microsoft.com/office/drawing/2014/main" id="{8F89A86F-0401-834D-B129-B98EB091796F}"/>
+              </a:ext>
+            </a:extLst>
+          </p:cNvPr>
+          <p:cNvSpPr>
+            <a:spLocks noGrp="1"/>
+          </p:cNvSpPr>
+          <p:nvPr>
+            <p:ph type="sldNum" sz="quarter" idx="12"/>
+          </p:nvPr>
+        </p:nvSpPr>
+        <p:spPr/>
+        <p:txBody>
+          <a:bodyPr/>
+          <a:lstStyle/>
+          <a:p>
+            <a:fld id="{31DE2C5B-556E-47B8-A792-024C2FCA4ACC}" type="slidenum">
+              <a:rPr lang="en-GB" smtClean="0"/>
+              <a:t>26</a:t>
+            </a:fld>
+            <a:endParaRPr lang="en-GB"/>
+          </a:p>
+        </p:txBody>
+      </p:sp>
     </p:spTree>
     <p:extLst>
       <p:ext uri="{BB962C8B-B14F-4D97-AF65-F5344CB8AC3E}">
@@ -14122,6 +14645,35 @@
           </a:fontRef>
         </p:style>
       </p:cxnSp>
+      <p:sp>
+        <p:nvSpPr>
+          <p:cNvPr id="3" name="Slide Number Placeholder 2">
+            <a:extLst>
+              <a:ext uri="{FF2B5EF4-FFF2-40B4-BE49-F238E27FC236}">
+                <a16:creationId xmlns:a16="http://schemas.microsoft.com/office/drawing/2014/main" id="{9154E9D2-7A89-F44D-AF87-067C03E567A7}"/>
+              </a:ext>
+            </a:extLst>
+          </p:cNvPr>
+          <p:cNvSpPr>
+            <a:spLocks noGrp="1"/>
+          </p:cNvSpPr>
+          <p:nvPr>
+            <p:ph type="sldNum" sz="quarter" idx="12"/>
+          </p:nvPr>
+        </p:nvSpPr>
+        <p:spPr/>
+        <p:txBody>
+          <a:bodyPr/>
+          <a:lstStyle/>
+          <a:p>
+            <a:fld id="{31DE2C5B-556E-47B8-A792-024C2FCA4ACC}" type="slidenum">
+              <a:rPr lang="en-GB" smtClean="0"/>
+              <a:t>27</a:t>
+            </a:fld>
+            <a:endParaRPr lang="en-GB"/>
+          </a:p>
+        </p:txBody>
+      </p:sp>
     </p:spTree>
     <p:extLst>
       <p:ext uri="{BB962C8B-B14F-4D97-AF65-F5344CB8AC3E}">
@@ -14448,6 +15000,35 @@
           </a:fontRef>
         </p:style>
       </p:cxnSp>
+      <p:sp>
+        <p:nvSpPr>
+          <p:cNvPr id="3" name="Slide Number Placeholder 2">
+            <a:extLst>
+              <a:ext uri="{FF2B5EF4-FFF2-40B4-BE49-F238E27FC236}">
+                <a16:creationId xmlns:a16="http://schemas.microsoft.com/office/drawing/2014/main" id="{51B29569-E2F1-9B4F-9A21-B0C98135DF83}"/>
+              </a:ext>
+            </a:extLst>
+          </p:cNvPr>
+          <p:cNvSpPr>
+            <a:spLocks noGrp="1"/>
+          </p:cNvSpPr>
+          <p:nvPr>
+            <p:ph type="sldNum" sz="quarter" idx="12"/>
+          </p:nvPr>
+        </p:nvSpPr>
+        <p:spPr/>
+        <p:txBody>
+          <a:bodyPr/>
+          <a:lstStyle/>
+          <a:p>
+            <a:fld id="{31DE2C5B-556E-47B8-A792-024C2FCA4ACC}" type="slidenum">
+              <a:rPr lang="en-GB" smtClean="0"/>
+              <a:t>28</a:t>
+            </a:fld>
+            <a:endParaRPr lang="en-GB"/>
+          </a:p>
+        </p:txBody>
+      </p:sp>
     </p:spTree>
     <p:extLst>
       <p:ext uri="{BB962C8B-B14F-4D97-AF65-F5344CB8AC3E}">
@@ -14823,6 +15404,35 @@
           </a:p>
           <a:p>
             <a:endParaRPr lang="en-IT" dirty="0"/>
+          </a:p>
+        </p:txBody>
+      </p:sp>
+      <p:sp>
+        <p:nvSpPr>
+          <p:cNvPr id="3" name="Slide Number Placeholder 2">
+            <a:extLst>
+              <a:ext uri="{FF2B5EF4-FFF2-40B4-BE49-F238E27FC236}">
+                <a16:creationId xmlns:a16="http://schemas.microsoft.com/office/drawing/2014/main" id="{5ED7CB96-6715-ED4D-9229-69136B6E06D6}"/>
+              </a:ext>
+            </a:extLst>
+          </p:cNvPr>
+          <p:cNvSpPr>
+            <a:spLocks noGrp="1"/>
+          </p:cNvSpPr>
+          <p:nvPr>
+            <p:ph type="sldNum" sz="quarter" idx="12"/>
+          </p:nvPr>
+        </p:nvSpPr>
+        <p:spPr/>
+        <p:txBody>
+          <a:bodyPr/>
+          <a:lstStyle/>
+          <a:p>
+            <a:fld id="{31DE2C5B-556E-47B8-A792-024C2FCA4ACC}" type="slidenum">
+              <a:rPr lang="en-GB" smtClean="0"/>
+              <a:t>29</a:t>
+            </a:fld>
+            <a:endParaRPr lang="en-GB"/>
           </a:p>
         </p:txBody>
       </p:sp>
@@ -17120,6 +17730,35 @@
           </a:prstGeom>
         </p:spPr>
       </p:pic>
+      <p:sp>
+        <p:nvSpPr>
+          <p:cNvPr id="3" name="Slide Number Placeholder 2">
+            <a:extLst>
+              <a:ext uri="{FF2B5EF4-FFF2-40B4-BE49-F238E27FC236}">
+                <a16:creationId xmlns:a16="http://schemas.microsoft.com/office/drawing/2014/main" id="{A034D796-D172-5049-8F4E-8577C9B54AEE}"/>
+              </a:ext>
+            </a:extLst>
+          </p:cNvPr>
+          <p:cNvSpPr>
+            <a:spLocks noGrp="1"/>
+          </p:cNvSpPr>
+          <p:nvPr>
+            <p:ph type="sldNum" sz="quarter" idx="12"/>
+          </p:nvPr>
+        </p:nvSpPr>
+        <p:spPr/>
+        <p:txBody>
+          <a:bodyPr/>
+          <a:lstStyle/>
+          <a:p>
+            <a:fld id="{31DE2C5B-556E-47B8-A792-024C2FCA4ACC}" type="slidenum">
+              <a:rPr lang="en-GB" smtClean="0"/>
+              <a:t>3</a:t>
+            </a:fld>
+            <a:endParaRPr lang="en-GB"/>
+          </a:p>
+        </p:txBody>
+      </p:sp>
     </p:spTree>
     <p:extLst>
       <p:ext uri="{BB962C8B-B14F-4D97-AF65-F5344CB8AC3E}">
@@ -17345,6 +17984,35 @@
           </a:p>
         </p:txBody>
       </p:sp>
+      <p:sp>
+        <p:nvSpPr>
+          <p:cNvPr id="3" name="Slide Number Placeholder 2">
+            <a:extLst>
+              <a:ext uri="{FF2B5EF4-FFF2-40B4-BE49-F238E27FC236}">
+                <a16:creationId xmlns:a16="http://schemas.microsoft.com/office/drawing/2014/main" id="{1896C29E-2316-B942-B887-683B9316379B}"/>
+              </a:ext>
+            </a:extLst>
+          </p:cNvPr>
+          <p:cNvSpPr>
+            <a:spLocks noGrp="1"/>
+          </p:cNvSpPr>
+          <p:nvPr>
+            <p:ph type="sldNum" sz="quarter" idx="12"/>
+          </p:nvPr>
+        </p:nvSpPr>
+        <p:spPr/>
+        <p:txBody>
+          <a:bodyPr/>
+          <a:lstStyle/>
+          <a:p>
+            <a:fld id="{31DE2C5B-556E-47B8-A792-024C2FCA4ACC}" type="slidenum">
+              <a:rPr lang="en-GB" smtClean="0"/>
+              <a:t>30</a:t>
+            </a:fld>
+            <a:endParaRPr lang="en-GB"/>
+          </a:p>
+        </p:txBody>
+      </p:sp>
     </p:spTree>
     <p:extLst>
       <p:ext uri="{BB962C8B-B14F-4D97-AF65-F5344CB8AC3E}">
@@ -17534,6 +18202,35 @@
           </a:p>
         </p:txBody>
       </p:sp>
+      <p:sp>
+        <p:nvSpPr>
+          <p:cNvPr id="4" name="Slide Number Placeholder 3">
+            <a:extLst>
+              <a:ext uri="{FF2B5EF4-FFF2-40B4-BE49-F238E27FC236}">
+                <a16:creationId xmlns:a16="http://schemas.microsoft.com/office/drawing/2014/main" id="{B750B37B-AE23-2C4B-BF29-10DE9A83E5C5}"/>
+              </a:ext>
+            </a:extLst>
+          </p:cNvPr>
+          <p:cNvSpPr>
+            <a:spLocks noGrp="1"/>
+          </p:cNvSpPr>
+          <p:nvPr>
+            <p:ph type="sldNum" sz="quarter" idx="12"/>
+          </p:nvPr>
+        </p:nvSpPr>
+        <p:spPr/>
+        <p:txBody>
+          <a:bodyPr/>
+          <a:lstStyle/>
+          <a:p>
+            <a:fld id="{31DE2C5B-556E-47B8-A792-024C2FCA4ACC}" type="slidenum">
+              <a:rPr lang="en-GB" smtClean="0"/>
+              <a:t>31</a:t>
+            </a:fld>
+            <a:endParaRPr lang="en-GB"/>
+          </a:p>
+        </p:txBody>
+      </p:sp>
     </p:spTree>
     <p:extLst>
       <p:ext uri="{BB962C8B-B14F-4D97-AF65-F5344CB8AC3E}">
@@ -17677,6 +18374,35 @@
           </a:p>
         </p:txBody>
       </p:sp>
+      <p:sp>
+        <p:nvSpPr>
+          <p:cNvPr id="4" name="Slide Number Placeholder 3">
+            <a:extLst>
+              <a:ext uri="{FF2B5EF4-FFF2-40B4-BE49-F238E27FC236}">
+                <a16:creationId xmlns:a16="http://schemas.microsoft.com/office/drawing/2014/main" id="{33B65F5E-766B-8A46-BC7B-5551310C6940}"/>
+              </a:ext>
+            </a:extLst>
+          </p:cNvPr>
+          <p:cNvSpPr>
+            <a:spLocks noGrp="1"/>
+          </p:cNvSpPr>
+          <p:nvPr>
+            <p:ph type="sldNum" sz="quarter" idx="12"/>
+          </p:nvPr>
+        </p:nvSpPr>
+        <p:spPr/>
+        <p:txBody>
+          <a:bodyPr/>
+          <a:lstStyle/>
+          <a:p>
+            <a:fld id="{31DE2C5B-556E-47B8-A792-024C2FCA4ACC}" type="slidenum">
+              <a:rPr lang="en-GB" smtClean="0"/>
+              <a:t>32</a:t>
+            </a:fld>
+            <a:endParaRPr lang="en-GB"/>
+          </a:p>
+        </p:txBody>
+      </p:sp>
     </p:spTree>
     <p:extLst>
       <p:ext uri="{BB962C8B-B14F-4D97-AF65-F5344CB8AC3E}">
@@ -18259,6 +18985,35 @@
           </a:p>
         </p:txBody>
       </p:sp>
+      <p:sp>
+        <p:nvSpPr>
+          <p:cNvPr id="3" name="Slide Number Placeholder 2">
+            <a:extLst>
+              <a:ext uri="{FF2B5EF4-FFF2-40B4-BE49-F238E27FC236}">
+                <a16:creationId xmlns:a16="http://schemas.microsoft.com/office/drawing/2014/main" id="{491DE765-501F-6541-9A0D-1C7F8D96DA60}"/>
+              </a:ext>
+            </a:extLst>
+          </p:cNvPr>
+          <p:cNvSpPr>
+            <a:spLocks noGrp="1"/>
+          </p:cNvSpPr>
+          <p:nvPr>
+            <p:ph type="sldNum" sz="quarter" idx="12"/>
+          </p:nvPr>
+        </p:nvSpPr>
+        <p:spPr/>
+        <p:txBody>
+          <a:bodyPr/>
+          <a:lstStyle/>
+          <a:p>
+            <a:fld id="{31DE2C5B-556E-47B8-A792-024C2FCA4ACC}" type="slidenum">
+              <a:rPr lang="en-GB" smtClean="0"/>
+              <a:t>33</a:t>
+            </a:fld>
+            <a:endParaRPr lang="en-GB"/>
+          </a:p>
+        </p:txBody>
+      </p:sp>
     </p:spTree>
     <p:extLst>
       <p:ext uri="{BB962C8B-B14F-4D97-AF65-F5344CB8AC3E}">
@@ -18448,6 +19203,35 @@
           </a:p>
         </p:txBody>
       </p:sp>
+      <p:sp>
+        <p:nvSpPr>
+          <p:cNvPr id="4" name="Slide Number Placeholder 3">
+            <a:extLst>
+              <a:ext uri="{FF2B5EF4-FFF2-40B4-BE49-F238E27FC236}">
+                <a16:creationId xmlns:a16="http://schemas.microsoft.com/office/drawing/2014/main" id="{1171AD0C-792C-CF4C-B1D5-345BFD596129}"/>
+              </a:ext>
+            </a:extLst>
+          </p:cNvPr>
+          <p:cNvSpPr>
+            <a:spLocks noGrp="1"/>
+          </p:cNvSpPr>
+          <p:nvPr>
+            <p:ph type="sldNum" sz="quarter" idx="12"/>
+          </p:nvPr>
+        </p:nvSpPr>
+        <p:spPr/>
+        <p:txBody>
+          <a:bodyPr/>
+          <a:lstStyle/>
+          <a:p>
+            <a:fld id="{31DE2C5B-556E-47B8-A792-024C2FCA4ACC}" type="slidenum">
+              <a:rPr lang="en-GB" smtClean="0"/>
+              <a:t>34</a:t>
+            </a:fld>
+            <a:endParaRPr lang="en-GB"/>
+          </a:p>
+        </p:txBody>
+      </p:sp>
     </p:spTree>
     <p:extLst>
       <p:ext uri="{BB962C8B-B14F-4D97-AF65-F5344CB8AC3E}">
@@ -18579,6 +19363,35 @@
           </a:p>
         </p:txBody>
       </p:sp>
+      <p:sp>
+        <p:nvSpPr>
+          <p:cNvPr id="4" name="Slide Number Placeholder 3">
+            <a:extLst>
+              <a:ext uri="{FF2B5EF4-FFF2-40B4-BE49-F238E27FC236}">
+                <a16:creationId xmlns:a16="http://schemas.microsoft.com/office/drawing/2014/main" id="{E68CFC3E-1378-2647-904C-EBD658AAFA78}"/>
+              </a:ext>
+            </a:extLst>
+          </p:cNvPr>
+          <p:cNvSpPr>
+            <a:spLocks noGrp="1"/>
+          </p:cNvSpPr>
+          <p:nvPr>
+            <p:ph type="sldNum" sz="quarter" idx="12"/>
+          </p:nvPr>
+        </p:nvSpPr>
+        <p:spPr/>
+        <p:txBody>
+          <a:bodyPr/>
+          <a:lstStyle/>
+          <a:p>
+            <a:fld id="{31DE2C5B-556E-47B8-A792-024C2FCA4ACC}" type="slidenum">
+              <a:rPr lang="en-GB" smtClean="0"/>
+              <a:t>35</a:t>
+            </a:fld>
+            <a:endParaRPr lang="en-GB"/>
+          </a:p>
+        </p:txBody>
+      </p:sp>
     </p:spTree>
     <p:extLst>
       <p:ext uri="{BB962C8B-B14F-4D97-AF65-F5344CB8AC3E}">
@@ -18768,6 +19581,35 @@
           </a:p>
         </p:txBody>
       </p:sp>
+      <p:sp>
+        <p:nvSpPr>
+          <p:cNvPr id="4" name="Slide Number Placeholder 3">
+            <a:extLst>
+              <a:ext uri="{FF2B5EF4-FFF2-40B4-BE49-F238E27FC236}">
+                <a16:creationId xmlns:a16="http://schemas.microsoft.com/office/drawing/2014/main" id="{17E875FA-29EF-4844-8FBA-457AB668E4F4}"/>
+              </a:ext>
+            </a:extLst>
+          </p:cNvPr>
+          <p:cNvSpPr>
+            <a:spLocks noGrp="1"/>
+          </p:cNvSpPr>
+          <p:nvPr>
+            <p:ph type="sldNum" sz="quarter" idx="12"/>
+          </p:nvPr>
+        </p:nvSpPr>
+        <p:spPr/>
+        <p:txBody>
+          <a:bodyPr/>
+          <a:lstStyle/>
+          <a:p>
+            <a:fld id="{31DE2C5B-556E-47B8-A792-024C2FCA4ACC}" type="slidenum">
+              <a:rPr lang="en-GB" smtClean="0"/>
+              <a:t>36</a:t>
+            </a:fld>
+            <a:endParaRPr lang="en-GB"/>
+          </a:p>
+        </p:txBody>
+      </p:sp>
     </p:spTree>
     <p:extLst>
       <p:ext uri="{BB962C8B-B14F-4D97-AF65-F5344CB8AC3E}">
@@ -18920,6 +19762,35 @@
           </a:p>
         </p:txBody>
       </p:sp>
+      <p:sp>
+        <p:nvSpPr>
+          <p:cNvPr id="4" name="Slide Number Placeholder 3">
+            <a:extLst>
+              <a:ext uri="{FF2B5EF4-FFF2-40B4-BE49-F238E27FC236}">
+                <a16:creationId xmlns:a16="http://schemas.microsoft.com/office/drawing/2014/main" id="{80C65FD1-2BD8-A345-B072-D664E64012BF}"/>
+              </a:ext>
+            </a:extLst>
+          </p:cNvPr>
+          <p:cNvSpPr>
+            <a:spLocks noGrp="1"/>
+          </p:cNvSpPr>
+          <p:nvPr>
+            <p:ph type="sldNum" sz="quarter" idx="12"/>
+          </p:nvPr>
+        </p:nvSpPr>
+        <p:spPr/>
+        <p:txBody>
+          <a:bodyPr/>
+          <a:lstStyle/>
+          <a:p>
+            <a:fld id="{31DE2C5B-556E-47B8-A792-024C2FCA4ACC}" type="slidenum">
+              <a:rPr lang="en-GB" smtClean="0"/>
+              <a:t>37</a:t>
+            </a:fld>
+            <a:endParaRPr lang="en-GB"/>
+          </a:p>
+        </p:txBody>
+      </p:sp>
     </p:spTree>
     <p:extLst>
       <p:ext uri="{BB962C8B-B14F-4D97-AF65-F5344CB8AC3E}">
@@ -19110,6 +19981,35 @@
           </a:p>
         </p:txBody>
       </p:sp>
+      <p:sp>
+        <p:nvSpPr>
+          <p:cNvPr id="4" name="Slide Number Placeholder 3">
+            <a:extLst>
+              <a:ext uri="{FF2B5EF4-FFF2-40B4-BE49-F238E27FC236}">
+                <a16:creationId xmlns:a16="http://schemas.microsoft.com/office/drawing/2014/main" id="{A8184B95-FAF2-B74C-AA9B-B8C6983F7852}"/>
+              </a:ext>
+            </a:extLst>
+          </p:cNvPr>
+          <p:cNvSpPr>
+            <a:spLocks noGrp="1"/>
+          </p:cNvSpPr>
+          <p:nvPr>
+            <p:ph type="sldNum" sz="quarter" idx="12"/>
+          </p:nvPr>
+        </p:nvSpPr>
+        <p:spPr/>
+        <p:txBody>
+          <a:bodyPr/>
+          <a:lstStyle/>
+          <a:p>
+            <a:fld id="{31DE2C5B-556E-47B8-A792-024C2FCA4ACC}" type="slidenum">
+              <a:rPr lang="en-GB" smtClean="0"/>
+              <a:t>4</a:t>
+            </a:fld>
+            <a:endParaRPr lang="en-GB"/>
+          </a:p>
+        </p:txBody>
+      </p:sp>
     </p:spTree>
     <p:extLst>
       <p:ext uri="{BB962C8B-B14F-4D97-AF65-F5344CB8AC3E}">
@@ -19198,7 +20098,7 @@
           <a:p>
             <a:r>
               <a:rPr lang="en-IT" dirty="0"/>
-              <a:t>State stands for everything that is necessary to define how the app behaves and looks at some point in time:</a:t>
+              <a:t>State stands for everything that is necessary to define how the app and its screen behave and look at some point in time:</a:t>
             </a:r>
           </a:p>
           <a:p>
@@ -19247,7 +20147,15 @@
             </a:r>
             <a:r>
               <a:rPr lang="en-IT" dirty="0"/>
-              <a:t>: sometimes called local state, what can be striclty contained in a Widget </a:t>
+              <a:t>: sometimes called </a:t>
+            </a:r>
+            <a:r>
+              <a:rPr lang="en-IT" i="1" dirty="0"/>
+              <a:t>local state</a:t>
+            </a:r>
+            <a:r>
+              <a:rPr lang="en-IT" dirty="0"/>
+              <a:t>, what can be striclty contained in a Widget </a:t>
             </a:r>
           </a:p>
           <a:p>
@@ -19258,11 +20166,48 @@
             </a:r>
             <a:r>
               <a:rPr lang="en-IT" dirty="0"/>
-              <a:t>: sometimes called shared state, things that you want to share across many parts of the app</a:t>
+              <a:t>: sometimes called </a:t>
+            </a:r>
+            <a:r>
+              <a:rPr lang="en-IT" i="1" dirty="0"/>
+              <a:t>shared state</a:t>
+            </a:r>
+            <a:r>
+              <a:rPr lang="en-IT" dirty="0"/>
+              <a:t>, things that you want to share across many parts of the app</a:t>
             </a:r>
           </a:p>
           <a:p>
             <a:endParaRPr lang="en-IT" dirty="0"/>
+          </a:p>
+        </p:txBody>
+      </p:sp>
+      <p:sp>
+        <p:nvSpPr>
+          <p:cNvPr id="3" name="Slide Number Placeholder 2">
+            <a:extLst>
+              <a:ext uri="{FF2B5EF4-FFF2-40B4-BE49-F238E27FC236}">
+                <a16:creationId xmlns:a16="http://schemas.microsoft.com/office/drawing/2014/main" id="{D595DFC4-130B-2C45-A12D-84AC2FC6B4F6}"/>
+              </a:ext>
+            </a:extLst>
+          </p:cNvPr>
+          <p:cNvSpPr>
+            <a:spLocks noGrp="1"/>
+          </p:cNvSpPr>
+          <p:nvPr>
+            <p:ph type="sldNum" sz="quarter" idx="12"/>
+          </p:nvPr>
+        </p:nvSpPr>
+        <p:spPr/>
+        <p:txBody>
+          <a:bodyPr/>
+          <a:lstStyle/>
+          <a:p>
+            <a:fld id="{31DE2C5B-556E-47B8-A792-024C2FCA4ACC}" type="slidenum">
+              <a:rPr lang="en-GB" smtClean="0"/>
+              <a:t>5</a:t>
+            </a:fld>
+            <a:endParaRPr lang="en-GB"/>
           </a:p>
         </p:txBody>
       </p:sp>
@@ -19392,6 +20337,35 @@
           </a:prstGeom>
         </p:spPr>
       </p:pic>
+      <p:sp>
+        <p:nvSpPr>
+          <p:cNvPr id="4" name="Slide Number Placeholder 3">
+            <a:extLst>
+              <a:ext uri="{FF2B5EF4-FFF2-40B4-BE49-F238E27FC236}">
+                <a16:creationId xmlns:a16="http://schemas.microsoft.com/office/drawing/2014/main" id="{7842D3C8-7575-A545-BF72-EF0DC285B841}"/>
+              </a:ext>
+            </a:extLst>
+          </p:cNvPr>
+          <p:cNvSpPr>
+            <a:spLocks noGrp="1"/>
+          </p:cNvSpPr>
+          <p:nvPr>
+            <p:ph type="sldNum" sz="quarter" idx="12"/>
+          </p:nvPr>
+        </p:nvSpPr>
+        <p:spPr/>
+        <p:txBody>
+          <a:bodyPr/>
+          <a:lstStyle/>
+          <a:p>
+            <a:fld id="{31DE2C5B-556E-47B8-A792-024C2FCA4ACC}" type="slidenum">
+              <a:rPr lang="en-GB" smtClean="0"/>
+              <a:t>6</a:t>
+            </a:fld>
+            <a:endParaRPr lang="en-GB"/>
+          </a:p>
+        </p:txBody>
+      </p:sp>
     </p:spTree>
     <p:extLst>
       <p:ext uri="{BB962C8B-B14F-4D97-AF65-F5344CB8AC3E}">
@@ -19545,6 +20519,35 @@
           </a:prstGeom>
         </p:spPr>
       </p:pic>
+      <p:sp>
+        <p:nvSpPr>
+          <p:cNvPr id="4" name="Slide Number Placeholder 3">
+            <a:extLst>
+              <a:ext uri="{FF2B5EF4-FFF2-40B4-BE49-F238E27FC236}">
+                <a16:creationId xmlns:a16="http://schemas.microsoft.com/office/drawing/2014/main" id="{C57BC1AD-B85B-6F44-A358-D08723755994}"/>
+              </a:ext>
+            </a:extLst>
+          </p:cNvPr>
+          <p:cNvSpPr>
+            <a:spLocks noGrp="1"/>
+          </p:cNvSpPr>
+          <p:nvPr>
+            <p:ph type="sldNum" sz="quarter" idx="12"/>
+          </p:nvPr>
+        </p:nvSpPr>
+        <p:spPr/>
+        <p:txBody>
+          <a:bodyPr/>
+          <a:lstStyle/>
+          <a:p>
+            <a:fld id="{31DE2C5B-556E-47B8-A792-024C2FCA4ACC}" type="slidenum">
+              <a:rPr lang="en-GB" smtClean="0"/>
+              <a:t>7</a:t>
+            </a:fld>
+            <a:endParaRPr lang="en-GB"/>
+          </a:p>
+        </p:txBody>
+      </p:sp>
     </p:spTree>
     <p:extLst>
       <p:ext uri="{BB962C8B-B14F-4D97-AF65-F5344CB8AC3E}">
@@ -19687,6 +20690,35 @@
           </a:p>
         </p:txBody>
       </p:sp>
+      <p:sp>
+        <p:nvSpPr>
+          <p:cNvPr id="3" name="Slide Number Placeholder 2">
+            <a:extLst>
+              <a:ext uri="{FF2B5EF4-FFF2-40B4-BE49-F238E27FC236}">
+                <a16:creationId xmlns:a16="http://schemas.microsoft.com/office/drawing/2014/main" id="{2942B687-1842-0E4B-B7EC-B11C850C13D1}"/>
+              </a:ext>
+            </a:extLst>
+          </p:cNvPr>
+          <p:cNvSpPr>
+            <a:spLocks noGrp="1"/>
+          </p:cNvSpPr>
+          <p:nvPr>
+            <p:ph type="sldNum" sz="quarter" idx="12"/>
+          </p:nvPr>
+        </p:nvSpPr>
+        <p:spPr/>
+        <p:txBody>
+          <a:bodyPr/>
+          <a:lstStyle/>
+          <a:p>
+            <a:fld id="{31DE2C5B-556E-47B8-A792-024C2FCA4ACC}" type="slidenum">
+              <a:rPr lang="en-GB" smtClean="0"/>
+              <a:t>8</a:t>
+            </a:fld>
+            <a:endParaRPr lang="en-GB"/>
+          </a:p>
+        </p:txBody>
+      </p:sp>
     </p:spTree>
     <p:extLst>
       <p:ext uri="{BB962C8B-B14F-4D97-AF65-F5344CB8AC3E}">
@@ -20087,6 +21119,35 @@
               <a:effectLst/>
               <a:latin typeface="Courier" pitchFamily="2" charset="0"/>
             </a:endParaRPr>
+          </a:p>
+        </p:txBody>
+      </p:sp>
+      <p:sp>
+        <p:nvSpPr>
+          <p:cNvPr id="3" name="Slide Number Placeholder 2">
+            <a:extLst>
+              <a:ext uri="{FF2B5EF4-FFF2-40B4-BE49-F238E27FC236}">
+                <a16:creationId xmlns:a16="http://schemas.microsoft.com/office/drawing/2014/main" id="{352BFD94-8BFC-FA4D-9311-071744E69B7D}"/>
+              </a:ext>
+            </a:extLst>
+          </p:cNvPr>
+          <p:cNvSpPr>
+            <a:spLocks noGrp="1"/>
+          </p:cNvSpPr>
+          <p:nvPr>
+            <p:ph type="sldNum" sz="quarter" idx="12"/>
+          </p:nvPr>
+        </p:nvSpPr>
+        <p:spPr/>
+        <p:txBody>
+          <a:bodyPr/>
+          <a:lstStyle/>
+          <a:p>
+            <a:fld id="{31DE2C5B-556E-47B8-A792-024C2FCA4ACC}" type="slidenum">
+              <a:rPr lang="en-GB" smtClean="0"/>
+              <a:t>9</a:t>
+            </a:fld>
+            <a:endParaRPr lang="en-GB"/>
           </a:p>
         </p:txBody>
       </p:sp>

</xml_diff>

<commit_message>
[master] updated lab 7
</commit_message>
<xml_diff>
--- a/lab_07-state_management/lab_07-state_management.pptx
+++ b/lab_07-state_management/lab_07-state_management.pptx
@@ -145,6 +145,9 @@
     <p:ext uri="{EFAFB233-063F-42B5-8137-9DF3F51BA10A}">
       <p15:sldGuideLst xmlns:p15="http://schemas.microsoft.com/office/powerpoint/2012/main"/>
     </p:ext>
+    <p:ext uri="{2D200454-40CA-4A62-9FC3-DE9A4176ACB9}">
+      <p15:notesGuideLst xmlns:p15="http://schemas.microsoft.com/office/powerpoint/2012/main"/>
+    </p:ext>
   </p:extLst>
 </p:presentation>
 </file>
@@ -231,7 +234,7 @@
           <a:p>
             <a:fld id="{81C4B3FE-0320-8142-8396-5C3025C019EC}" type="datetimeFigureOut">
               <a:rPr lang="en-IT" smtClean="0"/>
-              <a:t>14/04/23</a:t>
+              <a:t>4/16/24</a:t>
             </a:fld>
             <a:endParaRPr lang="en-IT"/>
           </a:p>
@@ -12229,78 +12232,6 @@
           <a:chExt cx="0" cy="0"/>
         </a:xfrm>
       </p:grpSpPr>
-      <p:pic>
-        <p:nvPicPr>
-          <p:cNvPr id="4" name="Picture 3" descr="A picture containing text&#10;&#10;Description automatically generated">
-            <a:extLst>
-              <a:ext uri="{FF2B5EF4-FFF2-40B4-BE49-F238E27FC236}">
-                <a16:creationId xmlns:a16="http://schemas.microsoft.com/office/drawing/2014/main" id="{3F9D3E45-5F76-644B-BD01-BF2B7C3B60D1}"/>
-              </a:ext>
-            </a:extLst>
-          </p:cNvPr>
-          <p:cNvPicPr>
-            <a:picLocks noChangeAspect="1"/>
-          </p:cNvPicPr>
-          <p:nvPr/>
-        </p:nvPicPr>
-        <p:blipFill>
-          <a:blip r:embed="rId2">
-            <a:extLst>
-              <a:ext uri="{28A0092B-C50C-407E-A947-70E740481C1C}">
-                <a14:useLocalDpi xmlns:a14="http://schemas.microsoft.com/office/drawing/2010/main" val="0"/>
-              </a:ext>
-            </a:extLst>
-          </a:blip>
-          <a:stretch>
-            <a:fillRect/>
-          </a:stretch>
-        </p:blipFill>
-        <p:spPr>
-          <a:xfrm>
-            <a:off x="6342442" y="1170604"/>
-            <a:ext cx="2332797" cy="5048760"/>
-          </a:xfrm>
-          <a:prstGeom prst="rect">
-            <a:avLst/>
-          </a:prstGeom>
-        </p:spPr>
-      </p:pic>
-      <p:pic>
-        <p:nvPicPr>
-          <p:cNvPr id="7" name="Picture 6" descr="Text&#10;&#10;Description automatically generated with medium confidence">
-            <a:extLst>
-              <a:ext uri="{FF2B5EF4-FFF2-40B4-BE49-F238E27FC236}">
-                <a16:creationId xmlns:a16="http://schemas.microsoft.com/office/drawing/2014/main" id="{D20C791B-4456-E34F-B259-6765E443560F}"/>
-              </a:ext>
-            </a:extLst>
-          </p:cNvPr>
-          <p:cNvPicPr>
-            <a:picLocks noChangeAspect="1"/>
-          </p:cNvPicPr>
-          <p:nvPr/>
-        </p:nvPicPr>
-        <p:blipFill>
-          <a:blip r:embed="rId3">
-            <a:extLst>
-              <a:ext uri="{28A0092B-C50C-407E-A947-70E740481C1C}">
-                <a14:useLocalDpi xmlns:a14="http://schemas.microsoft.com/office/drawing/2010/main" val="0"/>
-              </a:ext>
-            </a:extLst>
-          </a:blip>
-          <a:stretch>
-            <a:fillRect/>
-          </a:stretch>
-        </p:blipFill>
-        <p:spPr>
-          <a:xfrm>
-            <a:off x="9503345" y="1170604"/>
-            <a:ext cx="2332798" cy="5048760"/>
-          </a:xfrm>
-          <a:prstGeom prst="rect">
-            <a:avLst/>
-          </a:prstGeom>
-        </p:spPr>
-      </p:pic>
       <p:sp>
         <p:nvSpPr>
           <p:cNvPr id="2" name="Title 1">
@@ -12370,47 +12301,6 @@
           </a:p>
         </p:txBody>
       </p:sp>
-      <p:cxnSp>
-        <p:nvCxnSpPr>
-          <p:cNvPr id="42" name="Straight Arrow Connector 41">
-            <a:extLst>
-              <a:ext uri="{FF2B5EF4-FFF2-40B4-BE49-F238E27FC236}">
-                <a16:creationId xmlns:a16="http://schemas.microsoft.com/office/drawing/2014/main" id="{BAD1BE7E-31FC-2F4F-B1AA-08AABBF3791F}"/>
-              </a:ext>
-            </a:extLst>
-          </p:cNvPr>
-          <p:cNvCxnSpPr>
-            <a:cxnSpLocks/>
-          </p:cNvCxnSpPr>
-          <p:nvPr/>
-        </p:nvCxnSpPr>
-        <p:spPr>
-          <a:xfrm>
-            <a:off x="8675239" y="1610886"/>
-            <a:ext cx="1334346" cy="0"/>
-          </a:xfrm>
-          <a:prstGeom prst="straightConnector1">
-            <a:avLst/>
-          </a:prstGeom>
-          <a:ln w="38100">
-            <a:tailEnd type="triangle"/>
-          </a:ln>
-        </p:spPr>
-        <p:style>
-          <a:lnRef idx="1">
-            <a:schemeClr val="accent6"/>
-          </a:lnRef>
-          <a:fillRef idx="0">
-            <a:schemeClr val="accent6"/>
-          </a:fillRef>
-          <a:effectRef idx="0">
-            <a:schemeClr val="accent6"/>
-          </a:effectRef>
-          <a:fontRef idx="minor">
-            <a:schemeClr val="tx1"/>
-          </a:fontRef>
-        </p:style>
-      </p:cxnSp>
       <p:sp>
         <p:nvSpPr>
           <p:cNvPr id="21" name="Content Placeholder 2">
@@ -12651,7 +12541,7 @@
           <p:nvPr/>
         </p:nvPicPr>
         <p:blipFill>
-          <a:blip r:embed="rId4">
+          <a:blip r:embed="rId2">
             <a:extLst>
               <a:ext uri="{28A0092B-C50C-407E-A947-70E740481C1C}">
                 <a14:useLocalDpi xmlns:a14="http://schemas.microsoft.com/office/drawing/2010/main" val="0"/>
@@ -12701,6 +12591,119 @@
           </a:p>
         </p:txBody>
       </p:sp>
+      <p:pic>
+        <p:nvPicPr>
+          <p:cNvPr id="8" name="Picture 7" descr="A screenshot of a cell phone&#10;&#10;Description automatically generated">
+            <a:extLst>
+              <a:ext uri="{FF2B5EF4-FFF2-40B4-BE49-F238E27FC236}">
+                <a16:creationId xmlns:a16="http://schemas.microsoft.com/office/drawing/2014/main" id="{9453415D-DD63-0170-C752-6EE3E990D0FA}"/>
+              </a:ext>
+            </a:extLst>
+          </p:cNvPr>
+          <p:cNvPicPr>
+            <a:picLocks noChangeAspect="1"/>
+          </p:cNvPicPr>
+          <p:nvPr/>
+        </p:nvPicPr>
+        <p:blipFill>
+          <a:blip r:embed="rId3">
+            <a:extLst>
+              <a:ext uri="{28A0092B-C50C-407E-A947-70E740481C1C}">
+                <a14:useLocalDpi xmlns:a14="http://schemas.microsoft.com/office/drawing/2010/main" val="0"/>
+              </a:ext>
+            </a:extLst>
+          </a:blip>
+          <a:stretch>
+            <a:fillRect/>
+          </a:stretch>
+        </p:blipFill>
+        <p:spPr>
+          <a:xfrm>
+            <a:off x="6230058" y="1214728"/>
+            <a:ext cx="2445181" cy="5299789"/>
+          </a:xfrm>
+          <a:prstGeom prst="rect">
+            <a:avLst/>
+          </a:prstGeom>
+        </p:spPr>
+      </p:pic>
+      <p:pic>
+        <p:nvPicPr>
+          <p:cNvPr id="11" name="Picture 10" descr="A white background with black text&#10;&#10;Description automatically generated">
+            <a:extLst>
+              <a:ext uri="{FF2B5EF4-FFF2-40B4-BE49-F238E27FC236}">
+                <a16:creationId xmlns:a16="http://schemas.microsoft.com/office/drawing/2014/main" id="{417BD423-4FC5-9967-48E3-BD87C6DEF7B5}"/>
+              </a:ext>
+            </a:extLst>
+          </p:cNvPr>
+          <p:cNvPicPr>
+            <a:picLocks noChangeAspect="1"/>
+          </p:cNvPicPr>
+          <p:nvPr/>
+        </p:nvPicPr>
+        <p:blipFill>
+          <a:blip r:embed="rId4">
+            <a:extLst>
+              <a:ext uri="{28A0092B-C50C-407E-A947-70E740481C1C}">
+                <a14:useLocalDpi xmlns:a14="http://schemas.microsoft.com/office/drawing/2010/main" val="0"/>
+              </a:ext>
+            </a:extLst>
+          </a:blip>
+          <a:stretch>
+            <a:fillRect/>
+          </a:stretch>
+        </p:blipFill>
+        <p:spPr>
+          <a:xfrm>
+            <a:off x="9375607" y="1199338"/>
+            <a:ext cx="2420879" cy="5247114"/>
+          </a:xfrm>
+          <a:prstGeom prst="rect">
+            <a:avLst/>
+          </a:prstGeom>
+        </p:spPr>
+      </p:pic>
+      <p:cxnSp>
+        <p:nvCxnSpPr>
+          <p:cNvPr id="12" name="Straight Arrow Connector 11">
+            <a:extLst>
+              <a:ext uri="{FF2B5EF4-FFF2-40B4-BE49-F238E27FC236}">
+                <a16:creationId xmlns:a16="http://schemas.microsoft.com/office/drawing/2014/main" id="{30D89783-726B-A416-3D79-64B3767FDE03}"/>
+              </a:ext>
+            </a:extLst>
+          </p:cNvPr>
+          <p:cNvCxnSpPr>
+            <a:cxnSpLocks/>
+          </p:cNvCxnSpPr>
+          <p:nvPr/>
+        </p:nvCxnSpPr>
+        <p:spPr>
+          <a:xfrm>
+            <a:off x="8708434" y="1679466"/>
+            <a:ext cx="1334346" cy="0"/>
+          </a:xfrm>
+          <a:prstGeom prst="straightConnector1">
+            <a:avLst/>
+          </a:prstGeom>
+          <a:ln w="38100">
+            <a:tailEnd type="triangle"/>
+          </a:ln>
+        </p:spPr>
+        <p:style>
+          <a:lnRef idx="1">
+            <a:schemeClr val="accent6"/>
+          </a:lnRef>
+          <a:fillRef idx="0">
+            <a:schemeClr val="accent6"/>
+          </a:fillRef>
+          <a:effectRef idx="0">
+            <a:schemeClr val="accent6"/>
+          </a:effectRef>
+          <a:fontRef idx="minor">
+            <a:schemeClr val="tx1"/>
+          </a:fontRef>
+        </p:style>
+      </p:cxnSp>
     </p:spTree>
     <p:extLst>
       <p:ext uri="{BB962C8B-B14F-4D97-AF65-F5344CB8AC3E}">
@@ -15387,12 +15390,245 @@
           </a:p>
         </p:txBody>
       </p:sp>
+      <p:sp>
+        <p:nvSpPr>
+          <p:cNvPr id="29" name="Rectangle 28">
+            <a:extLst>
+              <a:ext uri="{FF2B5EF4-FFF2-40B4-BE49-F238E27FC236}">
+                <a16:creationId xmlns:a16="http://schemas.microsoft.com/office/drawing/2014/main" id="{C6376DD2-D4AA-EC49-ABA3-50DB41E08529}"/>
+              </a:ext>
+            </a:extLst>
+          </p:cNvPr>
+          <p:cNvSpPr/>
+          <p:nvPr/>
+        </p:nvSpPr>
+        <p:spPr>
+          <a:xfrm>
+            <a:off x="534413" y="5461054"/>
+            <a:ext cx="2049118" cy="584775"/>
+          </a:xfrm>
+          <a:prstGeom prst="rect">
+            <a:avLst/>
+          </a:prstGeom>
+        </p:spPr>
+        <p:txBody>
+          <a:bodyPr wrap="square">
+            <a:spAutoFit/>
+          </a:bodyPr>
+          <a:lstStyle/>
+          <a:p>
+            <a:r>
+              <a:rPr lang="en-IT" sz="1600" dirty="0">
+                <a:latin typeface="Palatino Linotype" panose="02040502050505030304" pitchFamily="18" charset="0"/>
+              </a:rPr>
+              <a:t>Homepage is initially empty</a:t>
+            </a:r>
+          </a:p>
+        </p:txBody>
+      </p:sp>
+      <p:sp>
+        <p:nvSpPr>
+          <p:cNvPr id="30" name="Rectangle 29">
+            <a:extLst>
+              <a:ext uri="{FF2B5EF4-FFF2-40B4-BE49-F238E27FC236}">
+                <a16:creationId xmlns:a16="http://schemas.microsoft.com/office/drawing/2014/main" id="{D103D3E3-C557-EF43-8409-D2BE67BA5353}"/>
+              </a:ext>
+            </a:extLst>
+          </p:cNvPr>
+          <p:cNvSpPr/>
+          <p:nvPr/>
+        </p:nvSpPr>
+        <p:spPr>
+          <a:xfrm>
+            <a:off x="2784310" y="5423575"/>
+            <a:ext cx="2049118" cy="1323439"/>
+          </a:xfrm>
+          <a:prstGeom prst="rect">
+            <a:avLst/>
+          </a:prstGeom>
+        </p:spPr>
+        <p:txBody>
+          <a:bodyPr wrap="square">
+            <a:spAutoFit/>
+          </a:bodyPr>
+          <a:lstStyle/>
+          <a:p>
+            <a:r>
+              <a:rPr lang="en-IT" sz="1600" dirty="0">
+                <a:latin typeface="Palatino Linotype" panose="02040502050505030304" pitchFamily="18" charset="0"/>
+              </a:rPr>
+              <a:t>When the button is tapped the user navigates to another page where he/she can add a new meal</a:t>
+            </a:r>
+          </a:p>
+        </p:txBody>
+      </p:sp>
+      <p:sp>
+        <p:nvSpPr>
+          <p:cNvPr id="31" name="Rectangle 30">
+            <a:extLst>
+              <a:ext uri="{FF2B5EF4-FFF2-40B4-BE49-F238E27FC236}">
+                <a16:creationId xmlns:a16="http://schemas.microsoft.com/office/drawing/2014/main" id="{8D75CCD2-B1B2-EF4E-BCDC-258E9B2C88DD}"/>
+              </a:ext>
+            </a:extLst>
+          </p:cNvPr>
+          <p:cNvSpPr/>
+          <p:nvPr/>
+        </p:nvSpPr>
+        <p:spPr>
+          <a:xfrm>
+            <a:off x="5189405" y="5423575"/>
+            <a:ext cx="2049118" cy="1077218"/>
+          </a:xfrm>
+          <a:prstGeom prst="rect">
+            <a:avLst/>
+          </a:prstGeom>
+        </p:spPr>
+        <p:txBody>
+          <a:bodyPr wrap="square">
+            <a:spAutoFit/>
+          </a:bodyPr>
+          <a:lstStyle/>
+          <a:p>
+            <a:r>
+              <a:rPr lang="en-IT" sz="1600" dirty="0">
+                <a:latin typeface="Palatino Linotype" panose="02040502050505030304" pitchFamily="18" charset="0"/>
+              </a:rPr>
+              <a:t>When the </a:t>
+            </a:r>
+            <a:r>
+              <a:rPr lang="en-IT" sz="1600">
+                <a:latin typeface="Palatino Linotype" panose="02040502050505030304" pitchFamily="18" charset="0"/>
+              </a:rPr>
+              <a:t>user </a:t>
+            </a:r>
+            <a:r>
+              <a:rPr lang="en-US" sz="1600">
+                <a:latin typeface="Palatino Linotype" panose="02040502050505030304" pitchFamily="18" charset="0"/>
+              </a:rPr>
+              <a:t>finishes,</a:t>
+            </a:r>
+            <a:r>
+              <a:rPr lang="en-IT" sz="1600">
+                <a:latin typeface="Palatino Linotype" panose="02040502050505030304" pitchFamily="18" charset="0"/>
+              </a:rPr>
+              <a:t> </a:t>
+            </a:r>
+            <a:r>
+              <a:rPr lang="en-IT" sz="1600" dirty="0">
+                <a:latin typeface="Palatino Linotype" panose="02040502050505030304" pitchFamily="18" charset="0"/>
+              </a:rPr>
+              <a:t>the new meal is added to the list</a:t>
+            </a:r>
+          </a:p>
+        </p:txBody>
+      </p:sp>
+      <p:sp>
+        <p:nvSpPr>
+          <p:cNvPr id="32" name="Rectangle 31">
+            <a:extLst>
+              <a:ext uri="{FF2B5EF4-FFF2-40B4-BE49-F238E27FC236}">
+                <a16:creationId xmlns:a16="http://schemas.microsoft.com/office/drawing/2014/main" id="{55B51B24-C99A-544D-9531-6DD27BC03D55}"/>
+              </a:ext>
+            </a:extLst>
+          </p:cNvPr>
+          <p:cNvSpPr/>
+          <p:nvPr/>
+        </p:nvSpPr>
+        <p:spPr>
+          <a:xfrm>
+            <a:off x="7248780" y="5461054"/>
+            <a:ext cx="2049118" cy="1323439"/>
+          </a:xfrm>
+          <a:prstGeom prst="rect">
+            <a:avLst/>
+          </a:prstGeom>
+        </p:spPr>
+        <p:txBody>
+          <a:bodyPr wrap="square">
+            <a:spAutoFit/>
+          </a:bodyPr>
+          <a:lstStyle/>
+          <a:p>
+            <a:r>
+              <a:rPr lang="en-IT" sz="1600" dirty="0">
+                <a:latin typeface="Palatino Linotype" panose="02040502050505030304" pitchFamily="18" charset="0"/>
+              </a:rPr>
+              <a:t>When the meal is tapped, the user navigates to a new screen where he/she can edit or delete it</a:t>
+            </a:r>
+          </a:p>
+        </p:txBody>
+      </p:sp>
+      <p:sp>
+        <p:nvSpPr>
+          <p:cNvPr id="33" name="Rectangle 32">
+            <a:extLst>
+              <a:ext uri="{FF2B5EF4-FFF2-40B4-BE49-F238E27FC236}">
+                <a16:creationId xmlns:a16="http://schemas.microsoft.com/office/drawing/2014/main" id="{E7488CCA-8AA7-A24E-84CB-726D1CD4AD9C}"/>
+              </a:ext>
+            </a:extLst>
+          </p:cNvPr>
+          <p:cNvSpPr/>
+          <p:nvPr/>
+        </p:nvSpPr>
+        <p:spPr>
+          <a:xfrm>
+            <a:off x="9747368" y="5507220"/>
+            <a:ext cx="2049118" cy="830997"/>
+          </a:xfrm>
+          <a:prstGeom prst="rect">
+            <a:avLst/>
+          </a:prstGeom>
+        </p:spPr>
+        <p:txBody>
+          <a:bodyPr wrap="square">
+            <a:spAutoFit/>
+          </a:bodyPr>
+          <a:lstStyle/>
+          <a:p>
+            <a:r>
+              <a:rPr lang="en-IT" sz="1600" dirty="0">
+                <a:latin typeface="Palatino Linotype" panose="02040502050505030304" pitchFamily="18" charset="0"/>
+              </a:rPr>
+              <a:t>If the meal is edited/deleted the list is updated.</a:t>
+            </a:r>
+          </a:p>
+        </p:txBody>
+      </p:sp>
+      <p:sp>
+        <p:nvSpPr>
+          <p:cNvPr id="3" name="Slide Number Placeholder 2">
+            <a:extLst>
+              <a:ext uri="{FF2B5EF4-FFF2-40B4-BE49-F238E27FC236}">
+                <a16:creationId xmlns:a16="http://schemas.microsoft.com/office/drawing/2014/main" id="{491DE765-501F-6541-9A0D-1C7F8D96DA60}"/>
+              </a:ext>
+            </a:extLst>
+          </p:cNvPr>
+          <p:cNvSpPr>
+            <a:spLocks noGrp="1"/>
+          </p:cNvSpPr>
+          <p:nvPr>
+            <p:ph type="sldNum" sz="quarter" idx="12"/>
+          </p:nvPr>
+        </p:nvSpPr>
+        <p:spPr/>
+        <p:txBody>
+          <a:bodyPr/>
+          <a:lstStyle/>
+          <a:p>
+            <a:fld id="{31DE2C5B-556E-47B8-A792-024C2FCA4ACC}" type="slidenum">
+              <a:rPr lang="en-GB" smtClean="0"/>
+              <a:t>31</a:t>
+            </a:fld>
+            <a:endParaRPr lang="en-GB"/>
+          </a:p>
+        </p:txBody>
+      </p:sp>
       <p:pic>
         <p:nvPicPr>
-          <p:cNvPr id="7" name="Picture 6" descr="Text&#10;&#10;Description automatically generated with low confidence">
-            <a:extLst>
-              <a:ext uri="{FF2B5EF4-FFF2-40B4-BE49-F238E27FC236}">
-                <a16:creationId xmlns:a16="http://schemas.microsoft.com/office/drawing/2014/main" id="{229550AA-FD5D-9841-A567-158DE1010324}"/>
+          <p:cNvPr id="5" name="Picture 4" descr="A white background with black text&#10;&#10;Description automatically generated">
+            <a:extLst>
+              <a:ext uri="{FF2B5EF4-FFF2-40B4-BE49-F238E27FC236}">
+                <a16:creationId xmlns:a16="http://schemas.microsoft.com/office/drawing/2014/main" id="{79A8310B-DB16-045B-3EC4-406F5550B4B7}"/>
               </a:ext>
             </a:extLst>
           </p:cNvPr>
@@ -15415,8 +15651,8 @@
         </p:blipFill>
         <p:spPr>
           <a:xfrm>
-            <a:off x="534413" y="1244173"/>
-            <a:ext cx="1845847" cy="3994877"/>
+            <a:off x="375413" y="1267254"/>
+            <a:ext cx="1843131" cy="3994880"/>
           </a:xfrm>
           <a:prstGeom prst="rect">
             <a:avLst/>
@@ -15425,10 +15661,10 @@
       </p:pic>
       <p:pic>
         <p:nvPicPr>
-          <p:cNvPr id="13" name="Picture 12" descr="Graphical user interface, application&#10;&#10;Description automatically generated">
-            <a:extLst>
-              <a:ext uri="{FF2B5EF4-FFF2-40B4-BE49-F238E27FC236}">
-                <a16:creationId xmlns:a16="http://schemas.microsoft.com/office/drawing/2014/main" id="{5DA9A1FF-442D-4E46-91FE-2A3D467141F6}"/>
+          <p:cNvPr id="9" name="Picture 8" descr="A screenshot of a phone&#10;&#10;Description automatically generated">
+            <a:extLst>
+              <a:ext uri="{FF2B5EF4-FFF2-40B4-BE49-F238E27FC236}">
+                <a16:creationId xmlns:a16="http://schemas.microsoft.com/office/drawing/2014/main" id="{D029C91F-511D-9666-827D-62D4ED27C77A}"/>
               </a:ext>
             </a:extLst>
           </p:cNvPr>
@@ -15451,8 +15687,8 @@
         </p:blipFill>
         <p:spPr>
           <a:xfrm>
-            <a:off x="7440091" y="1244173"/>
-            <a:ext cx="1845848" cy="3994880"/>
+            <a:off x="2887304" y="1244171"/>
+            <a:ext cx="1843131" cy="3994880"/>
           </a:xfrm>
           <a:prstGeom prst="rect">
             <a:avLst/>
@@ -15461,10 +15697,10 @@
       </p:pic>
       <p:pic>
         <p:nvPicPr>
-          <p:cNvPr id="15" name="Picture 14" descr="A picture containing shape&#10;&#10;Description automatically generated">
-            <a:extLst>
-              <a:ext uri="{FF2B5EF4-FFF2-40B4-BE49-F238E27FC236}">
-                <a16:creationId xmlns:a16="http://schemas.microsoft.com/office/drawing/2014/main" id="{D96F6853-65E7-9740-8338-216A71848F94}"/>
+          <p:cNvPr id="11" name="Picture 10" descr="A white background with black dots&#10;&#10;Description automatically generated">
+            <a:extLst>
+              <a:ext uri="{FF2B5EF4-FFF2-40B4-BE49-F238E27FC236}">
+                <a16:creationId xmlns:a16="http://schemas.microsoft.com/office/drawing/2014/main" id="{A98B1D53-4ADE-7531-4B2B-E3E1E1196276}"/>
               </a:ext>
             </a:extLst>
           </p:cNvPr>
@@ -15487,80 +15723,8 @@
         </p:blipFill>
         <p:spPr>
           <a:xfrm>
-            <a:off x="5189405" y="1244173"/>
-            <a:ext cx="1845847" cy="3994876"/>
-          </a:xfrm>
-          <a:prstGeom prst="rect">
-            <a:avLst/>
-          </a:prstGeom>
-        </p:spPr>
-      </p:pic>
-      <p:pic>
-        <p:nvPicPr>
-          <p:cNvPr id="17" name="Picture 16" descr="Graphical user interface, application&#10;&#10;Description automatically generated">
-            <a:extLst>
-              <a:ext uri="{FF2B5EF4-FFF2-40B4-BE49-F238E27FC236}">
-                <a16:creationId xmlns:a16="http://schemas.microsoft.com/office/drawing/2014/main" id="{E35F7A13-493A-D543-BD6D-3B0AEA476E81}"/>
-              </a:ext>
-            </a:extLst>
-          </p:cNvPr>
-          <p:cNvPicPr>
-            <a:picLocks noChangeAspect="1"/>
-          </p:cNvPicPr>
-          <p:nvPr/>
-        </p:nvPicPr>
-        <p:blipFill>
-          <a:blip r:embed="rId5">
-            <a:extLst>
-              <a:ext uri="{28A0092B-C50C-407E-A947-70E740481C1C}">
-                <a14:useLocalDpi xmlns:a14="http://schemas.microsoft.com/office/drawing/2010/main" val="0"/>
-              </a:ext>
-            </a:extLst>
-          </a:blip>
-          <a:stretch>
-            <a:fillRect/>
-          </a:stretch>
-        </p:blipFill>
-        <p:spPr>
-          <a:xfrm>
-            <a:off x="2938719" y="1244173"/>
-            <a:ext cx="1845847" cy="3994877"/>
-          </a:xfrm>
-          <a:prstGeom prst="rect">
-            <a:avLst/>
-          </a:prstGeom>
-        </p:spPr>
-      </p:pic>
-      <p:pic>
-        <p:nvPicPr>
-          <p:cNvPr id="18" name="Picture 17" descr="Text&#10;&#10;Description automatically generated with low confidence">
-            <a:extLst>
-              <a:ext uri="{FF2B5EF4-FFF2-40B4-BE49-F238E27FC236}">
-                <a16:creationId xmlns:a16="http://schemas.microsoft.com/office/drawing/2014/main" id="{7D5007F7-B1D1-004C-9DFA-56E9214DB89C}"/>
-              </a:ext>
-            </a:extLst>
-          </p:cNvPr>
-          <p:cNvPicPr>
-            <a:picLocks noChangeAspect="1"/>
-          </p:cNvPicPr>
-          <p:nvPr/>
-        </p:nvPicPr>
-        <p:blipFill>
-          <a:blip r:embed="rId2">
-            <a:extLst>
-              <a:ext uri="{28A0092B-C50C-407E-A947-70E740481C1C}">
-                <a14:useLocalDpi xmlns:a14="http://schemas.microsoft.com/office/drawing/2010/main" val="0"/>
-              </a:ext>
-            </a:extLst>
-          </a:blip>
-          <a:stretch>
-            <a:fillRect/>
-          </a:stretch>
-        </p:blipFill>
-        <p:spPr>
-          <a:xfrm>
-            <a:off x="9811740" y="1244173"/>
-            <a:ext cx="1845847" cy="3994877"/>
+            <a:off x="5292398" y="1267254"/>
+            <a:ext cx="1843131" cy="3994880"/>
           </a:xfrm>
           <a:prstGeom prst="rect">
             <a:avLst/>
@@ -15569,10 +15733,10 @@
       </p:pic>
       <p:cxnSp>
         <p:nvCxnSpPr>
-          <p:cNvPr id="19" name="Straight Arrow Connector 18">
-            <a:extLst>
-              <a:ext uri="{FF2B5EF4-FFF2-40B4-BE49-F238E27FC236}">
-                <a16:creationId xmlns:a16="http://schemas.microsoft.com/office/drawing/2014/main" id="{AACDA53D-1F2C-3848-81A9-8193B7A15A93}"/>
+          <p:cNvPr id="12" name="Straight Arrow Connector 11">
+            <a:extLst>
+              <a:ext uri="{FF2B5EF4-FFF2-40B4-BE49-F238E27FC236}">
+                <a16:creationId xmlns:a16="http://schemas.microsoft.com/office/drawing/2014/main" id="{0F58221F-8E69-FC96-117A-B35677389077}"/>
               </a:ext>
             </a:extLst>
           </p:cNvPr>
@@ -15582,9 +15746,9 @@
           <p:nvPr/>
         </p:nvCxnSpPr>
         <p:spPr>
-          <a:xfrm flipV="1">
-            <a:off x="2218544" y="2908092"/>
-            <a:ext cx="944381" cy="1926236"/>
+          <a:xfrm>
+            <a:off x="4699416" y="1618950"/>
+            <a:ext cx="936886" cy="1019319"/>
           </a:xfrm>
           <a:prstGeom prst="straightConnector1">
             <a:avLst/>
@@ -15610,10 +15774,10 @@
       </p:cxnSp>
       <p:cxnSp>
         <p:nvCxnSpPr>
-          <p:cNvPr id="22" name="Straight Arrow Connector 21">
-            <a:extLst>
-              <a:ext uri="{FF2B5EF4-FFF2-40B4-BE49-F238E27FC236}">
-                <a16:creationId xmlns:a16="http://schemas.microsoft.com/office/drawing/2014/main" id="{80FDB17F-EE10-B748-AC3B-CA75BB6BB6C2}"/>
+          <p:cNvPr id="14" name="Straight Arrow Connector 13">
+            <a:extLst>
+              <a:ext uri="{FF2B5EF4-FFF2-40B4-BE49-F238E27FC236}">
+                <a16:creationId xmlns:a16="http://schemas.microsoft.com/office/drawing/2014/main" id="{754E8FD3-9A05-D3D5-76F0-EA88063DC08A}"/>
               </a:ext>
             </a:extLst>
           </p:cNvPr>
@@ -15623,9 +15787,9 @@
           <p:nvPr/>
         </p:nvCxnSpPr>
         <p:spPr>
-          <a:xfrm>
-            <a:off x="4699416" y="1618950"/>
-            <a:ext cx="936886" cy="1019319"/>
+          <a:xfrm flipV="1">
+            <a:off x="2218544" y="2908092"/>
+            <a:ext cx="944381" cy="1926236"/>
           </a:xfrm>
           <a:prstGeom prst="straightConnector1">
             <a:avLst/>
@@ -15649,12 +15813,48 @@
           </a:fontRef>
         </p:style>
       </p:cxnSp>
+      <p:pic>
+        <p:nvPicPr>
+          <p:cNvPr id="20" name="Picture 19" descr="A screenshot of a phone&#10;&#10;Description automatically generated">
+            <a:extLst>
+              <a:ext uri="{FF2B5EF4-FFF2-40B4-BE49-F238E27FC236}">
+                <a16:creationId xmlns:a16="http://schemas.microsoft.com/office/drawing/2014/main" id="{2577ED07-9C84-AA09-2042-F7CB12150C87}"/>
+              </a:ext>
+            </a:extLst>
+          </p:cNvPr>
+          <p:cNvPicPr>
+            <a:picLocks noChangeAspect="1"/>
+          </p:cNvPicPr>
+          <p:nvPr/>
+        </p:nvPicPr>
+        <p:blipFill>
+          <a:blip r:embed="rId5">
+            <a:extLst>
+              <a:ext uri="{28A0092B-C50C-407E-A947-70E740481C1C}">
+                <a14:useLocalDpi xmlns:a14="http://schemas.microsoft.com/office/drawing/2010/main" val="0"/>
+              </a:ext>
+            </a:extLst>
+          </a:blip>
+          <a:stretch>
+            <a:fillRect/>
+          </a:stretch>
+        </p:blipFill>
+        <p:spPr>
+          <a:xfrm>
+            <a:off x="7351773" y="1267253"/>
+            <a:ext cx="1843132" cy="3994881"/>
+          </a:xfrm>
+          <a:prstGeom prst="rect">
+            <a:avLst/>
+          </a:prstGeom>
+        </p:spPr>
+      </p:pic>
       <p:cxnSp>
         <p:nvCxnSpPr>
-          <p:cNvPr id="25" name="Straight Arrow Connector 24">
-            <a:extLst>
-              <a:ext uri="{FF2B5EF4-FFF2-40B4-BE49-F238E27FC236}">
-                <a16:creationId xmlns:a16="http://schemas.microsoft.com/office/drawing/2014/main" id="{3BC5F105-16B0-864D-85A4-5E2B79E66F28}"/>
+          <p:cNvPr id="21" name="Straight Arrow Connector 20">
+            <a:extLst>
+              <a:ext uri="{FF2B5EF4-FFF2-40B4-BE49-F238E27FC236}">
+                <a16:creationId xmlns:a16="http://schemas.microsoft.com/office/drawing/2014/main" id="{276F3384-8B8C-0298-D3DF-04B21BB53A19}"/>
               </a:ext>
             </a:extLst>
           </p:cNvPr>
@@ -15690,12 +15890,48 @@
           </a:fontRef>
         </p:style>
       </p:cxnSp>
+      <p:pic>
+        <p:nvPicPr>
+          <p:cNvPr id="24" name="Picture 23" descr="A white background with black text&#10;&#10;Description automatically generated">
+            <a:extLst>
+              <a:ext uri="{FF2B5EF4-FFF2-40B4-BE49-F238E27FC236}">
+                <a16:creationId xmlns:a16="http://schemas.microsoft.com/office/drawing/2014/main" id="{05D4C093-F0ED-E881-DD97-573C818F5151}"/>
+              </a:ext>
+            </a:extLst>
+          </p:cNvPr>
+          <p:cNvPicPr>
+            <a:picLocks noChangeAspect="1"/>
+          </p:cNvPicPr>
+          <p:nvPr/>
+        </p:nvPicPr>
+        <p:blipFill>
+          <a:blip r:embed="rId6">
+            <a:extLst>
+              <a:ext uri="{28A0092B-C50C-407E-A947-70E740481C1C}">
+                <a14:useLocalDpi xmlns:a14="http://schemas.microsoft.com/office/drawing/2010/main" val="0"/>
+              </a:ext>
+            </a:extLst>
+          </a:blip>
+          <a:stretch>
+            <a:fillRect/>
+          </a:stretch>
+        </p:blipFill>
+        <p:spPr>
+          <a:xfrm>
+            <a:off x="9616507" y="1267253"/>
+            <a:ext cx="1843132" cy="3994882"/>
+          </a:xfrm>
+          <a:prstGeom prst="rect">
+            <a:avLst/>
+          </a:prstGeom>
+        </p:spPr>
+      </p:pic>
       <p:cxnSp>
         <p:nvCxnSpPr>
-          <p:cNvPr id="27" name="Straight Arrow Connector 26">
-            <a:extLst>
-              <a:ext uri="{FF2B5EF4-FFF2-40B4-BE49-F238E27FC236}">
-                <a16:creationId xmlns:a16="http://schemas.microsoft.com/office/drawing/2014/main" id="{47CA7D56-751D-2748-8AC2-396811921E33}"/>
+          <p:cNvPr id="26" name="Straight Arrow Connector 25">
+            <a:extLst>
+              <a:ext uri="{FF2B5EF4-FFF2-40B4-BE49-F238E27FC236}">
+                <a16:creationId xmlns:a16="http://schemas.microsoft.com/office/drawing/2014/main" id="{A765A5E0-DD98-BFF5-AF5A-75E6B886B437}"/>
               </a:ext>
             </a:extLst>
           </p:cNvPr>
@@ -15731,215 +15967,6 @@
           </a:fontRef>
         </p:style>
       </p:cxnSp>
-      <p:sp>
-        <p:nvSpPr>
-          <p:cNvPr id="29" name="Rectangle 28">
-            <a:extLst>
-              <a:ext uri="{FF2B5EF4-FFF2-40B4-BE49-F238E27FC236}">
-                <a16:creationId xmlns:a16="http://schemas.microsoft.com/office/drawing/2014/main" id="{C6376DD2-D4AA-EC49-ABA3-50DB41E08529}"/>
-              </a:ext>
-            </a:extLst>
-          </p:cNvPr>
-          <p:cNvSpPr/>
-          <p:nvPr/>
-        </p:nvSpPr>
-        <p:spPr>
-          <a:xfrm>
-            <a:off x="534413" y="5461054"/>
-            <a:ext cx="2049118" cy="584775"/>
-          </a:xfrm>
-          <a:prstGeom prst="rect">
-            <a:avLst/>
-          </a:prstGeom>
-        </p:spPr>
-        <p:txBody>
-          <a:bodyPr wrap="square">
-            <a:spAutoFit/>
-          </a:bodyPr>
-          <a:lstStyle/>
-          <a:p>
-            <a:r>
-              <a:rPr lang="en-IT" sz="1600" dirty="0">
-                <a:latin typeface="Palatino Linotype" panose="02040502050505030304" pitchFamily="18" charset="0"/>
-              </a:rPr>
-              <a:t>Homepage is initially empty</a:t>
-            </a:r>
-          </a:p>
-        </p:txBody>
-      </p:sp>
-      <p:sp>
-        <p:nvSpPr>
-          <p:cNvPr id="30" name="Rectangle 29">
-            <a:extLst>
-              <a:ext uri="{FF2B5EF4-FFF2-40B4-BE49-F238E27FC236}">
-                <a16:creationId xmlns:a16="http://schemas.microsoft.com/office/drawing/2014/main" id="{D103D3E3-C557-EF43-8409-D2BE67BA5353}"/>
-              </a:ext>
-            </a:extLst>
-          </p:cNvPr>
-          <p:cNvSpPr/>
-          <p:nvPr/>
-        </p:nvSpPr>
-        <p:spPr>
-          <a:xfrm>
-            <a:off x="3012299" y="5461054"/>
-            <a:ext cx="2049118" cy="1323439"/>
-          </a:xfrm>
-          <a:prstGeom prst="rect">
-            <a:avLst/>
-          </a:prstGeom>
-        </p:spPr>
-        <p:txBody>
-          <a:bodyPr wrap="square">
-            <a:spAutoFit/>
-          </a:bodyPr>
-          <a:lstStyle/>
-          <a:p>
-            <a:r>
-              <a:rPr lang="en-IT" sz="1600" dirty="0">
-                <a:latin typeface="Palatino Linotype" panose="02040502050505030304" pitchFamily="18" charset="0"/>
-              </a:rPr>
-              <a:t>When the button is tapped the user navigates to another page where he/she can add a new meal</a:t>
-            </a:r>
-          </a:p>
-        </p:txBody>
-      </p:sp>
-      <p:sp>
-        <p:nvSpPr>
-          <p:cNvPr id="31" name="Rectangle 30">
-            <a:extLst>
-              <a:ext uri="{FF2B5EF4-FFF2-40B4-BE49-F238E27FC236}">
-                <a16:creationId xmlns:a16="http://schemas.microsoft.com/office/drawing/2014/main" id="{8D75CCD2-B1B2-EF4E-BCDC-258E9B2C88DD}"/>
-              </a:ext>
-            </a:extLst>
-          </p:cNvPr>
-          <p:cNvSpPr/>
-          <p:nvPr/>
-        </p:nvSpPr>
-        <p:spPr>
-          <a:xfrm>
-            <a:off x="5189405" y="5423575"/>
-            <a:ext cx="2049118" cy="830997"/>
-          </a:xfrm>
-          <a:prstGeom prst="rect">
-            <a:avLst/>
-          </a:prstGeom>
-        </p:spPr>
-        <p:txBody>
-          <a:bodyPr wrap="square">
-            <a:spAutoFit/>
-          </a:bodyPr>
-          <a:lstStyle/>
-          <a:p>
-            <a:r>
-              <a:rPr lang="en-IT" sz="1600" dirty="0">
-                <a:latin typeface="Palatino Linotype" panose="02040502050505030304" pitchFamily="18" charset="0"/>
-              </a:rPr>
-              <a:t>When the user is done the new meal is added to the list</a:t>
-            </a:r>
-          </a:p>
-        </p:txBody>
-      </p:sp>
-      <p:sp>
-        <p:nvSpPr>
-          <p:cNvPr id="32" name="Rectangle 31">
-            <a:extLst>
-              <a:ext uri="{FF2B5EF4-FFF2-40B4-BE49-F238E27FC236}">
-                <a16:creationId xmlns:a16="http://schemas.microsoft.com/office/drawing/2014/main" id="{55B51B24-C99A-544D-9531-6DD27BC03D55}"/>
-              </a:ext>
-            </a:extLst>
-          </p:cNvPr>
-          <p:cNvSpPr/>
-          <p:nvPr/>
-        </p:nvSpPr>
-        <p:spPr>
-          <a:xfrm>
-            <a:off x="7248780" y="5461054"/>
-            <a:ext cx="2049118" cy="1323439"/>
-          </a:xfrm>
-          <a:prstGeom prst="rect">
-            <a:avLst/>
-          </a:prstGeom>
-        </p:spPr>
-        <p:txBody>
-          <a:bodyPr wrap="square">
-            <a:spAutoFit/>
-          </a:bodyPr>
-          <a:lstStyle/>
-          <a:p>
-            <a:r>
-              <a:rPr lang="en-IT" sz="1600" dirty="0">
-                <a:latin typeface="Palatino Linotype" panose="02040502050505030304" pitchFamily="18" charset="0"/>
-              </a:rPr>
-              <a:t>When the meal is tapped, the user navigates to a new screen where he/she can edit or delete it</a:t>
-            </a:r>
-          </a:p>
-        </p:txBody>
-      </p:sp>
-      <p:sp>
-        <p:nvSpPr>
-          <p:cNvPr id="33" name="Rectangle 32">
-            <a:extLst>
-              <a:ext uri="{FF2B5EF4-FFF2-40B4-BE49-F238E27FC236}">
-                <a16:creationId xmlns:a16="http://schemas.microsoft.com/office/drawing/2014/main" id="{E7488CCA-8AA7-A24E-84CB-726D1CD4AD9C}"/>
-              </a:ext>
-            </a:extLst>
-          </p:cNvPr>
-          <p:cNvSpPr/>
-          <p:nvPr/>
-        </p:nvSpPr>
-        <p:spPr>
-          <a:xfrm>
-            <a:off x="9747368" y="5507220"/>
-            <a:ext cx="2049118" cy="830997"/>
-          </a:xfrm>
-          <a:prstGeom prst="rect">
-            <a:avLst/>
-          </a:prstGeom>
-        </p:spPr>
-        <p:txBody>
-          <a:bodyPr wrap="square">
-            <a:spAutoFit/>
-          </a:bodyPr>
-          <a:lstStyle/>
-          <a:p>
-            <a:r>
-              <a:rPr lang="en-IT" sz="1600" dirty="0">
-                <a:latin typeface="Palatino Linotype" panose="02040502050505030304" pitchFamily="18" charset="0"/>
-              </a:rPr>
-              <a:t>If the meal is edited/deleted the list is updated.</a:t>
-            </a:r>
-          </a:p>
-        </p:txBody>
-      </p:sp>
-      <p:sp>
-        <p:nvSpPr>
-          <p:cNvPr id="3" name="Slide Number Placeholder 2">
-            <a:extLst>
-              <a:ext uri="{FF2B5EF4-FFF2-40B4-BE49-F238E27FC236}">
-                <a16:creationId xmlns:a16="http://schemas.microsoft.com/office/drawing/2014/main" id="{491DE765-501F-6541-9A0D-1C7F8D96DA60}"/>
-              </a:ext>
-            </a:extLst>
-          </p:cNvPr>
-          <p:cNvSpPr>
-            <a:spLocks noGrp="1"/>
-          </p:cNvSpPr>
-          <p:nvPr>
-            <p:ph type="sldNum" sz="quarter" idx="12"/>
-          </p:nvPr>
-        </p:nvSpPr>
-        <p:spPr/>
-        <p:txBody>
-          <a:bodyPr/>
-          <a:lstStyle/>
-          <a:p>
-            <a:fld id="{31DE2C5B-556E-47B8-A792-024C2FCA4ACC}" type="slidenum">
-              <a:rPr lang="en-GB" smtClean="0"/>
-              <a:t>31</a:t>
-            </a:fld>
-            <a:endParaRPr lang="en-GB"/>
-          </a:p>
-        </p:txBody>
-      </p:sp>
     </p:spTree>
     <p:extLst>
       <p:ext uri="{BB962C8B-B14F-4D97-AF65-F5344CB8AC3E}">

</xml_diff>